<commit_message>
se ocultaron los slides de MVC ya dictados
</commit_message>
<xml_diff>
--- a/Presentaciones/3 - Capacitacion MVC.PPTX
+++ b/Presentaciones/3 - Capacitacion MVC.PPTX
@@ -279,7 +279,7 @@
           <a:p>
             <a:fld id="{28529363-3187-4C19-A72D-75CA2BA8E726}" type="datetimeFigureOut">
               <a:rPr lang="en-US" smtClean="0"/>
-              <a:t>3/17/2016</a:t>
+              <a:t>4/4/2016</a:t>
             </a:fld>
             <a:endParaRPr lang="en-US" dirty="0"/>
           </a:p>
@@ -19491,7 +19491,7 @@
 </file>
 
 <file path=ppt/slides/slide1.xml><?xml version="1.0" encoding="utf-8"?>
-<p:sld xmlns:a="http://schemas.openxmlformats.org/drawingml/2006/main" xmlns:r="http://schemas.openxmlformats.org/officeDocument/2006/relationships" xmlns:p="http://schemas.openxmlformats.org/presentationml/2006/main">
+<p:sld xmlns:a="http://schemas.openxmlformats.org/drawingml/2006/main" xmlns:r="http://schemas.openxmlformats.org/officeDocument/2006/relationships" xmlns:p="http://schemas.openxmlformats.org/presentationml/2006/main" show="0">
   <p:cSld>
     <p:spTree>
       <p:nvGrpSpPr>
@@ -19587,11 +19587,19 @@
   <p:clrMapOvr>
     <a:masterClrMapping/>
   </p:clrMapOvr>
+  <mc:AlternateContent xmlns:mc="http://schemas.openxmlformats.org/markup-compatibility/2006">
+    <mc:Choice xmlns:p14="http://schemas.microsoft.com/office/powerpoint/2010/main" Requires="p14">
+      <p:transition spd="slow" p14:dur="2000"/>
+    </mc:Choice>
+    <mc:Fallback>
+      <p:transition spd="slow"/>
+    </mc:Fallback>
+  </mc:AlternateContent>
 </p:sld>
 </file>
 
 <file path=ppt/slides/slide10.xml><?xml version="1.0" encoding="utf-8"?>
-<p:sld xmlns:a="http://schemas.openxmlformats.org/drawingml/2006/main" xmlns:r="http://schemas.openxmlformats.org/officeDocument/2006/relationships" xmlns:p="http://schemas.openxmlformats.org/presentationml/2006/main">
+<p:sld xmlns:a="http://schemas.openxmlformats.org/drawingml/2006/main" xmlns:r="http://schemas.openxmlformats.org/officeDocument/2006/relationships" xmlns:p="http://schemas.openxmlformats.org/presentationml/2006/main" show="0">
   <p:cSld>
     <p:spTree>
       <p:nvGrpSpPr>
@@ -22043,6 +22051,14 @@
   <p:clrMapOvr>
     <a:masterClrMapping/>
   </p:clrMapOvr>
+  <mc:AlternateContent xmlns:mc="http://schemas.openxmlformats.org/markup-compatibility/2006">
+    <mc:Choice xmlns:p14="http://schemas.microsoft.com/office/powerpoint/2010/main" Requires="p14">
+      <p:transition spd="slow" p14:dur="2000"/>
+    </mc:Choice>
+    <mc:Fallback>
+      <p:transition spd="slow"/>
+    </mc:Fallback>
+  </mc:AlternateContent>
   <p:timing>
     <p:tnLst>
       <p:par>
@@ -22054,7 +22070,7 @@
 </file>
 
 <file path=ppt/slides/slide11.xml><?xml version="1.0" encoding="utf-8"?>
-<p:sld xmlns:a="http://schemas.openxmlformats.org/drawingml/2006/main" xmlns:r="http://schemas.openxmlformats.org/officeDocument/2006/relationships" xmlns:p="http://schemas.openxmlformats.org/presentationml/2006/main">
+<p:sld xmlns:a="http://schemas.openxmlformats.org/drawingml/2006/main" xmlns:r="http://schemas.openxmlformats.org/officeDocument/2006/relationships" xmlns:p="http://schemas.openxmlformats.org/presentationml/2006/main" show="0">
   <p:cSld>
     <p:spTree>
       <p:nvGrpSpPr>
@@ -22332,6 +22348,14 @@
   <p:clrMapOvr>
     <a:masterClrMapping/>
   </p:clrMapOvr>
+  <mc:AlternateContent xmlns:mc="http://schemas.openxmlformats.org/markup-compatibility/2006">
+    <mc:Choice xmlns:p14="http://schemas.microsoft.com/office/powerpoint/2010/main" Requires="p14">
+      <p:transition spd="slow" p14:dur="2000"/>
+    </mc:Choice>
+    <mc:Fallback>
+      <p:transition spd="slow"/>
+    </mc:Fallback>
+  </mc:AlternateContent>
   <p:timing>
     <p:tnLst>
       <p:par>
@@ -22343,7 +22367,7 @@
 </file>
 
 <file path=ppt/slides/slide12.xml><?xml version="1.0" encoding="utf-8"?>
-<p:sld xmlns:a="http://schemas.openxmlformats.org/drawingml/2006/main" xmlns:r="http://schemas.openxmlformats.org/officeDocument/2006/relationships" xmlns:p="http://schemas.openxmlformats.org/presentationml/2006/main">
+<p:sld xmlns:a="http://schemas.openxmlformats.org/drawingml/2006/main" xmlns:r="http://schemas.openxmlformats.org/officeDocument/2006/relationships" xmlns:p="http://schemas.openxmlformats.org/presentationml/2006/main" show="0">
   <p:cSld>
     <p:spTree>
       <p:nvGrpSpPr>
@@ -23263,6 +23287,14 @@
   <p:clrMapOvr>
     <a:masterClrMapping/>
   </p:clrMapOvr>
+  <mc:AlternateContent xmlns:mc="http://schemas.openxmlformats.org/markup-compatibility/2006">
+    <mc:Choice xmlns:p14="http://schemas.microsoft.com/office/powerpoint/2010/main" Requires="p14">
+      <p:transition spd="slow" p14:dur="2000"/>
+    </mc:Choice>
+    <mc:Fallback>
+      <p:transition spd="slow"/>
+    </mc:Fallback>
+  </mc:AlternateContent>
   <p:timing>
     <p:tnLst>
       <p:par>
@@ -23274,7 +23306,7 @@
 </file>
 
 <file path=ppt/slides/slide13.xml><?xml version="1.0" encoding="utf-8"?>
-<p:sld xmlns:a="http://schemas.openxmlformats.org/drawingml/2006/main" xmlns:r="http://schemas.openxmlformats.org/officeDocument/2006/relationships" xmlns:p="http://schemas.openxmlformats.org/presentationml/2006/main">
+<p:sld xmlns:a="http://schemas.openxmlformats.org/drawingml/2006/main" xmlns:r="http://schemas.openxmlformats.org/officeDocument/2006/relationships" xmlns:p="http://schemas.openxmlformats.org/presentationml/2006/main" show="0">
   <p:cSld>
     <p:spTree>
       <p:nvGrpSpPr>
@@ -23476,6 +23508,14 @@
   <p:clrMapOvr>
     <a:masterClrMapping/>
   </p:clrMapOvr>
+  <mc:AlternateContent xmlns:mc="http://schemas.openxmlformats.org/markup-compatibility/2006">
+    <mc:Choice xmlns:p14="http://schemas.microsoft.com/office/powerpoint/2010/main" Requires="p14">
+      <p:transition spd="slow" p14:dur="2000"/>
+    </mc:Choice>
+    <mc:Fallback>
+      <p:transition spd="slow"/>
+    </mc:Fallback>
+  </mc:AlternateContent>
   <p:timing>
     <p:tnLst>
       <p:par>
@@ -23487,7 +23527,7 @@
 </file>
 
 <file path=ppt/slides/slide14.xml><?xml version="1.0" encoding="utf-8"?>
-<p:sld xmlns:a="http://schemas.openxmlformats.org/drawingml/2006/main" xmlns:r="http://schemas.openxmlformats.org/officeDocument/2006/relationships" xmlns:p="http://schemas.openxmlformats.org/presentationml/2006/main">
+<p:sld xmlns:a="http://schemas.openxmlformats.org/drawingml/2006/main" xmlns:r="http://schemas.openxmlformats.org/officeDocument/2006/relationships" xmlns:p="http://schemas.openxmlformats.org/presentationml/2006/main" show="0">
   <p:cSld>
     <p:spTree>
       <p:nvGrpSpPr>
@@ -23607,6 +23647,14 @@
   <p:clrMapOvr>
     <a:masterClrMapping/>
   </p:clrMapOvr>
+  <mc:AlternateContent xmlns:mc="http://schemas.openxmlformats.org/markup-compatibility/2006">
+    <mc:Choice xmlns:p14="http://schemas.microsoft.com/office/powerpoint/2010/main" Requires="p14">
+      <p:transition spd="slow" p14:dur="2000"/>
+    </mc:Choice>
+    <mc:Fallback>
+      <p:transition spd="slow"/>
+    </mc:Fallback>
+  </mc:AlternateContent>
   <p:timing>
     <p:tnLst>
       <p:par>
@@ -23618,7 +23666,7 @@
 </file>
 
 <file path=ppt/slides/slide15.xml><?xml version="1.0" encoding="utf-8"?>
-<p:sld xmlns:a="http://schemas.openxmlformats.org/drawingml/2006/main" xmlns:r="http://schemas.openxmlformats.org/officeDocument/2006/relationships" xmlns:p="http://schemas.openxmlformats.org/presentationml/2006/main">
+<p:sld xmlns:a="http://schemas.openxmlformats.org/drawingml/2006/main" xmlns:r="http://schemas.openxmlformats.org/officeDocument/2006/relationships" xmlns:p="http://schemas.openxmlformats.org/presentationml/2006/main" show="0">
   <p:cSld>
     <p:spTree>
       <p:nvGrpSpPr>
@@ -23757,6 +23805,14 @@
   <p:clrMapOvr>
     <a:masterClrMapping/>
   </p:clrMapOvr>
+  <mc:AlternateContent xmlns:mc="http://schemas.openxmlformats.org/markup-compatibility/2006">
+    <mc:Choice xmlns:p14="http://schemas.microsoft.com/office/powerpoint/2010/main" Requires="p14">
+      <p:transition spd="slow" p14:dur="2000"/>
+    </mc:Choice>
+    <mc:Fallback>
+      <p:transition spd="slow"/>
+    </mc:Fallback>
+  </mc:AlternateContent>
   <p:timing>
     <p:tnLst>
       <p:par>
@@ -23768,7 +23824,7 @@
 </file>
 
 <file path=ppt/slides/slide16.xml><?xml version="1.0" encoding="utf-8"?>
-<p:sld xmlns:a="http://schemas.openxmlformats.org/drawingml/2006/main" xmlns:r="http://schemas.openxmlformats.org/officeDocument/2006/relationships" xmlns:p="http://schemas.openxmlformats.org/presentationml/2006/main">
+<p:sld xmlns:a="http://schemas.openxmlformats.org/drawingml/2006/main" xmlns:r="http://schemas.openxmlformats.org/officeDocument/2006/relationships" xmlns:p="http://schemas.openxmlformats.org/presentationml/2006/main" show="0">
   <p:cSld>
     <p:spTree>
       <p:nvGrpSpPr>
@@ -24127,6 +24183,14 @@
   <p:clrMapOvr>
     <a:masterClrMapping/>
   </p:clrMapOvr>
+  <mc:AlternateContent xmlns:mc="http://schemas.openxmlformats.org/markup-compatibility/2006">
+    <mc:Choice xmlns:p14="http://schemas.microsoft.com/office/powerpoint/2010/main" Requires="p14">
+      <p:transition spd="slow" p14:dur="2000"/>
+    </mc:Choice>
+    <mc:Fallback>
+      <p:transition spd="slow"/>
+    </mc:Fallback>
+  </mc:AlternateContent>
   <p:timing>
     <p:tnLst>
       <p:par>
@@ -24138,7 +24202,7 @@
 </file>
 
 <file path=ppt/slides/slide17.xml><?xml version="1.0" encoding="utf-8"?>
-<p:sld xmlns:a="http://schemas.openxmlformats.org/drawingml/2006/main" xmlns:r="http://schemas.openxmlformats.org/officeDocument/2006/relationships" xmlns:p="http://schemas.openxmlformats.org/presentationml/2006/main">
+<p:sld xmlns:a="http://schemas.openxmlformats.org/drawingml/2006/main" xmlns:r="http://schemas.openxmlformats.org/officeDocument/2006/relationships" xmlns:p="http://schemas.openxmlformats.org/presentationml/2006/main" show="0">
   <p:cSld>
     <p:spTree>
       <p:nvGrpSpPr>
@@ -24554,6 +24618,14 @@
   <p:clrMapOvr>
     <a:masterClrMapping/>
   </p:clrMapOvr>
+  <mc:AlternateContent xmlns:mc="http://schemas.openxmlformats.org/markup-compatibility/2006">
+    <mc:Choice xmlns:p14="http://schemas.microsoft.com/office/powerpoint/2010/main" Requires="p14">
+      <p:transition spd="slow" p14:dur="2000"/>
+    </mc:Choice>
+    <mc:Fallback>
+      <p:transition spd="slow"/>
+    </mc:Fallback>
+  </mc:AlternateContent>
   <p:timing>
     <p:tnLst>
       <p:par>
@@ -24762,6 +24834,14 @@
   <p:clrMapOvr>
     <a:masterClrMapping/>
   </p:clrMapOvr>
+  <mc:AlternateContent xmlns:mc="http://schemas.openxmlformats.org/markup-compatibility/2006">
+    <mc:Choice xmlns:p14="http://schemas.microsoft.com/office/powerpoint/2010/main" Requires="p14">
+      <p:transition spd="slow" p14:dur="2000"/>
+    </mc:Choice>
+    <mc:Fallback>
+      <p:transition spd="slow"/>
+    </mc:Fallback>
+  </mc:AlternateContent>
   <p:timing>
     <p:tnLst>
       <p:par>
@@ -25017,7 +25097,7 @@
 </file>
 
 <file path=ppt/slides/slide2.xml><?xml version="1.0" encoding="utf-8"?>
-<p:sld xmlns:a="http://schemas.openxmlformats.org/drawingml/2006/main" xmlns:r="http://schemas.openxmlformats.org/officeDocument/2006/relationships" xmlns:p="http://schemas.openxmlformats.org/presentationml/2006/main">
+<p:sld xmlns:a="http://schemas.openxmlformats.org/drawingml/2006/main" xmlns:r="http://schemas.openxmlformats.org/officeDocument/2006/relationships" xmlns:p="http://schemas.openxmlformats.org/presentationml/2006/main" show="0">
   <p:cSld>
     <p:spTree>
       <p:nvGrpSpPr>
@@ -25182,6 +25262,14 @@
   <p:clrMapOvr>
     <a:masterClrMapping/>
   </p:clrMapOvr>
+  <mc:AlternateContent xmlns:mc="http://schemas.openxmlformats.org/markup-compatibility/2006">
+    <mc:Choice xmlns:p14="http://schemas.microsoft.com/office/powerpoint/2010/main" Requires="p14">
+      <p:transition spd="slow" p14:dur="2000"/>
+    </mc:Choice>
+    <mc:Fallback>
+      <p:transition spd="slow"/>
+    </mc:Fallback>
+  </mc:AlternateContent>
   <p:timing>
     <p:tnLst>
       <p:par>
@@ -28764,7 +28852,7 @@
 </file>
 
 <file path=ppt/slides/slide3.xml><?xml version="1.0" encoding="utf-8"?>
-<p:sld xmlns:a="http://schemas.openxmlformats.org/drawingml/2006/main" xmlns:r="http://schemas.openxmlformats.org/officeDocument/2006/relationships" xmlns:p="http://schemas.openxmlformats.org/presentationml/2006/main">
+<p:sld xmlns:a="http://schemas.openxmlformats.org/drawingml/2006/main" xmlns:r="http://schemas.openxmlformats.org/officeDocument/2006/relationships" xmlns:p="http://schemas.openxmlformats.org/presentationml/2006/main" show="0">
   <p:cSld>
     <p:spTree>
       <p:nvGrpSpPr>
@@ -28843,6 +28931,14 @@
   <p:clrMapOvr>
     <a:masterClrMapping/>
   </p:clrMapOvr>
+  <mc:AlternateContent xmlns:mc="http://schemas.openxmlformats.org/markup-compatibility/2006">
+    <mc:Choice xmlns:p14="http://schemas.microsoft.com/office/powerpoint/2010/main" Requires="p14">
+      <p:transition spd="slow" p14:dur="2000"/>
+    </mc:Choice>
+    <mc:Fallback>
+      <p:transition spd="slow"/>
+    </mc:Fallback>
+  </mc:AlternateContent>
   <p:timing>
     <p:tnLst>
       <p:par>
@@ -32590,7 +32686,7 @@
 </file>
 
 <file path=ppt/slides/slide4.xml><?xml version="1.0" encoding="utf-8"?>
-<p:sld xmlns:a="http://schemas.openxmlformats.org/drawingml/2006/main" xmlns:r="http://schemas.openxmlformats.org/officeDocument/2006/relationships" xmlns:p="http://schemas.openxmlformats.org/presentationml/2006/main">
+<p:sld xmlns:a="http://schemas.openxmlformats.org/drawingml/2006/main" xmlns:r="http://schemas.openxmlformats.org/officeDocument/2006/relationships" xmlns:p="http://schemas.openxmlformats.org/presentationml/2006/main" show="0">
   <p:cSld>
     <p:spTree>
       <p:nvGrpSpPr>
@@ -32685,6 +32781,14 @@
   <p:clrMapOvr>
     <a:masterClrMapping/>
   </p:clrMapOvr>
+  <mc:AlternateContent xmlns:mc="http://schemas.openxmlformats.org/markup-compatibility/2006">
+    <mc:Choice xmlns:p14="http://schemas.microsoft.com/office/powerpoint/2010/main" Requires="p14">
+      <p:transition spd="slow" p14:dur="2000"/>
+    </mc:Choice>
+    <mc:Fallback>
+      <p:transition spd="slow"/>
+    </mc:Fallback>
+  </mc:AlternateContent>
   <p:timing>
     <p:tnLst>
       <p:par>
@@ -35585,7 +35689,7 @@
 </file>
 
 <file path=ppt/slides/slide5.xml><?xml version="1.0" encoding="utf-8"?>
-<p:sld xmlns:a="http://schemas.openxmlformats.org/drawingml/2006/main" xmlns:r="http://schemas.openxmlformats.org/officeDocument/2006/relationships" xmlns:p="http://schemas.openxmlformats.org/presentationml/2006/main">
+<p:sld xmlns:a="http://schemas.openxmlformats.org/drawingml/2006/main" xmlns:r="http://schemas.openxmlformats.org/officeDocument/2006/relationships" xmlns:p="http://schemas.openxmlformats.org/presentationml/2006/main" show="0">
   <p:cSld>
     <p:spTree>
       <p:nvGrpSpPr>
@@ -35690,6 +35794,14 @@
   <p:clrMapOvr>
     <a:masterClrMapping/>
   </p:clrMapOvr>
+  <mc:AlternateContent xmlns:mc="http://schemas.openxmlformats.org/markup-compatibility/2006">
+    <mc:Choice xmlns:p14="http://schemas.microsoft.com/office/powerpoint/2010/main" Requires="p14">
+      <p:transition spd="slow" p14:dur="2000"/>
+    </mc:Choice>
+    <mc:Fallback>
+      <p:transition spd="slow"/>
+    </mc:Fallback>
+  </mc:AlternateContent>
   <p:timing>
     <p:tnLst>
       <p:par>
@@ -37344,7 +37456,7 @@
 </file>
 
 <file path=ppt/slides/slide6.xml><?xml version="1.0" encoding="utf-8"?>
-<p:sld xmlns:a="http://schemas.openxmlformats.org/drawingml/2006/main" xmlns:r="http://schemas.openxmlformats.org/officeDocument/2006/relationships" xmlns:p="http://schemas.openxmlformats.org/presentationml/2006/main">
+<p:sld xmlns:a="http://schemas.openxmlformats.org/drawingml/2006/main" xmlns:r="http://schemas.openxmlformats.org/officeDocument/2006/relationships" xmlns:p="http://schemas.openxmlformats.org/presentationml/2006/main" show="0">
   <p:cSld>
     <p:spTree>
       <p:nvGrpSpPr>
@@ -37510,6 +37622,14 @@
   <p:clrMapOvr>
     <a:masterClrMapping/>
   </p:clrMapOvr>
+  <mc:AlternateContent xmlns:mc="http://schemas.openxmlformats.org/markup-compatibility/2006">
+    <mc:Choice xmlns:p14="http://schemas.microsoft.com/office/powerpoint/2010/main" Requires="p14">
+      <p:transition spd="slow" p14:dur="2000"/>
+    </mc:Choice>
+    <mc:Fallback>
+      <p:transition spd="slow"/>
+    </mc:Fallback>
+  </mc:AlternateContent>
   <p:timing>
     <p:tnLst>
       <p:par>
@@ -37521,7 +37641,7 @@
 </file>
 
 <file path=ppt/slides/slide7.xml><?xml version="1.0" encoding="utf-8"?>
-<p:sld xmlns:a="http://schemas.openxmlformats.org/drawingml/2006/main" xmlns:r="http://schemas.openxmlformats.org/officeDocument/2006/relationships" xmlns:p="http://schemas.openxmlformats.org/presentationml/2006/main">
+<p:sld xmlns:a="http://schemas.openxmlformats.org/drawingml/2006/main" xmlns:r="http://schemas.openxmlformats.org/officeDocument/2006/relationships" xmlns:p="http://schemas.openxmlformats.org/presentationml/2006/main" show="0">
   <p:cSld>
     <p:spTree>
       <p:nvGrpSpPr>
@@ -38622,6 +38742,14 @@
   <p:clrMapOvr>
     <a:masterClrMapping/>
   </p:clrMapOvr>
+  <mc:AlternateContent xmlns:mc="http://schemas.openxmlformats.org/markup-compatibility/2006">
+    <mc:Choice xmlns:p14="http://schemas.microsoft.com/office/powerpoint/2010/main" Requires="p14">
+      <p:transition spd="slow" p14:dur="2000"/>
+    </mc:Choice>
+    <mc:Fallback>
+      <p:transition spd="slow"/>
+    </mc:Fallback>
+  </mc:AlternateContent>
   <p:timing>
     <p:tnLst>
       <p:par>
@@ -38633,7 +38761,7 @@
 </file>
 
 <file path=ppt/slides/slide8.xml><?xml version="1.0" encoding="utf-8"?>
-<p:sld xmlns:a="http://schemas.openxmlformats.org/drawingml/2006/main" xmlns:r="http://schemas.openxmlformats.org/officeDocument/2006/relationships" xmlns:p="http://schemas.openxmlformats.org/presentationml/2006/main">
+<p:sld xmlns:a="http://schemas.openxmlformats.org/drawingml/2006/main" xmlns:r="http://schemas.openxmlformats.org/officeDocument/2006/relationships" xmlns:p="http://schemas.openxmlformats.org/presentationml/2006/main" show="0">
   <p:cSld>
     <p:spTree>
       <p:nvGrpSpPr>
@@ -38799,6 +38927,14 @@
   <p:clrMapOvr>
     <a:masterClrMapping/>
   </p:clrMapOvr>
+  <mc:AlternateContent xmlns:mc="http://schemas.openxmlformats.org/markup-compatibility/2006">
+    <mc:Choice xmlns:p14="http://schemas.microsoft.com/office/powerpoint/2010/main" Requires="p14">
+      <p:transition spd="slow" p14:dur="2000"/>
+    </mc:Choice>
+    <mc:Fallback>
+      <p:transition spd="slow"/>
+    </mc:Fallback>
+  </mc:AlternateContent>
   <p:timing>
     <p:tnLst>
       <p:par>
@@ -38810,7 +38946,7 @@
 </file>
 
 <file path=ppt/slides/slide9.xml><?xml version="1.0" encoding="utf-8"?>
-<p:sld xmlns:a="http://schemas.openxmlformats.org/drawingml/2006/main" xmlns:r="http://schemas.openxmlformats.org/officeDocument/2006/relationships" xmlns:p="http://schemas.openxmlformats.org/presentationml/2006/main">
+<p:sld xmlns:a="http://schemas.openxmlformats.org/drawingml/2006/main" xmlns:r="http://schemas.openxmlformats.org/officeDocument/2006/relationships" xmlns:p="http://schemas.openxmlformats.org/presentationml/2006/main" show="0">
   <p:cSld>
     <p:spTree>
       <p:nvGrpSpPr>
@@ -39088,6 +39224,14 @@
   <p:clrMapOvr>
     <a:masterClrMapping/>
   </p:clrMapOvr>
+  <mc:AlternateContent xmlns:mc="http://schemas.openxmlformats.org/markup-compatibility/2006">
+    <mc:Choice xmlns:p14="http://schemas.microsoft.com/office/powerpoint/2010/main" Requires="p14">
+      <p:transition spd="slow" p14:dur="2000"/>
+    </mc:Choice>
+    <mc:Fallback>
+      <p:transition spd="slow"/>
+    </mc:Fallback>
+  </mc:AlternateContent>
   <p:timing>
     <p:tnLst>
       <p:par>

</xml_diff>

<commit_message>
avances jornada martes 2016-04-05
</commit_message>
<xml_diff>
--- a/Presentaciones/3 - Capacitacion MVC.PPTX
+++ b/Presentaciones/3 - Capacitacion MVC.PPTX
@@ -279,7 +279,7 @@
           <a:p>
             <a:fld id="{28529363-3187-4C19-A72D-75CA2BA8E726}" type="datetimeFigureOut">
               <a:rPr lang="en-US" smtClean="0"/>
-              <a:t>4/4/2016</a:t>
+              <a:t>4/6/2016</a:t>
             </a:fld>
             <a:endParaRPr lang="en-US" dirty="0"/>
           </a:p>
@@ -19587,11 +19587,11 @@
   <p:clrMapOvr>
     <a:masterClrMapping/>
   </p:clrMapOvr>
-  <mc:AlternateContent xmlns:mc="http://schemas.openxmlformats.org/markup-compatibility/2006">
-    <mc:Choice xmlns:p14="http://schemas.microsoft.com/office/powerpoint/2010/main" Requires="p14">
+  <mc:AlternateContent xmlns:mc="http://schemas.openxmlformats.org/markup-compatibility/2006" xmlns:p14="http://schemas.microsoft.com/office/powerpoint/2010/main">
+    <mc:Choice Requires="p14">
       <p:transition spd="slow" p14:dur="2000"/>
     </mc:Choice>
-    <mc:Fallback>
+    <mc:Fallback xmlns="">
       <p:transition spd="slow"/>
     </mc:Fallback>
   </mc:AlternateContent>
@@ -22051,11 +22051,11 @@
   <p:clrMapOvr>
     <a:masterClrMapping/>
   </p:clrMapOvr>
-  <mc:AlternateContent xmlns:mc="http://schemas.openxmlformats.org/markup-compatibility/2006">
-    <mc:Choice xmlns:p14="http://schemas.microsoft.com/office/powerpoint/2010/main" Requires="p14">
+  <mc:AlternateContent xmlns:mc="http://schemas.openxmlformats.org/markup-compatibility/2006" xmlns:p14="http://schemas.microsoft.com/office/powerpoint/2010/main">
+    <mc:Choice Requires="p14">
       <p:transition spd="slow" p14:dur="2000"/>
     </mc:Choice>
-    <mc:Fallback>
+    <mc:Fallback xmlns="">
       <p:transition spd="slow"/>
     </mc:Fallback>
   </mc:AlternateContent>
@@ -22348,11 +22348,11 @@
   <p:clrMapOvr>
     <a:masterClrMapping/>
   </p:clrMapOvr>
-  <mc:AlternateContent xmlns:mc="http://schemas.openxmlformats.org/markup-compatibility/2006">
-    <mc:Choice xmlns:p14="http://schemas.microsoft.com/office/powerpoint/2010/main" Requires="p14">
+  <mc:AlternateContent xmlns:mc="http://schemas.openxmlformats.org/markup-compatibility/2006" xmlns:p14="http://schemas.microsoft.com/office/powerpoint/2010/main">
+    <mc:Choice Requires="p14">
       <p:transition spd="slow" p14:dur="2000"/>
     </mc:Choice>
-    <mc:Fallback>
+    <mc:Fallback xmlns="">
       <p:transition spd="slow"/>
     </mc:Fallback>
   </mc:AlternateContent>
@@ -23287,11 +23287,11 @@
   <p:clrMapOvr>
     <a:masterClrMapping/>
   </p:clrMapOvr>
-  <mc:AlternateContent xmlns:mc="http://schemas.openxmlformats.org/markup-compatibility/2006">
-    <mc:Choice xmlns:p14="http://schemas.microsoft.com/office/powerpoint/2010/main" Requires="p14">
+  <mc:AlternateContent xmlns:mc="http://schemas.openxmlformats.org/markup-compatibility/2006" xmlns:p14="http://schemas.microsoft.com/office/powerpoint/2010/main">
+    <mc:Choice Requires="p14">
       <p:transition spd="slow" p14:dur="2000"/>
     </mc:Choice>
-    <mc:Fallback>
+    <mc:Fallback xmlns="">
       <p:transition spd="slow"/>
     </mc:Fallback>
   </mc:AlternateContent>
@@ -23508,11 +23508,11 @@
   <p:clrMapOvr>
     <a:masterClrMapping/>
   </p:clrMapOvr>
-  <mc:AlternateContent xmlns:mc="http://schemas.openxmlformats.org/markup-compatibility/2006">
-    <mc:Choice xmlns:p14="http://schemas.microsoft.com/office/powerpoint/2010/main" Requires="p14">
+  <mc:AlternateContent xmlns:mc="http://schemas.openxmlformats.org/markup-compatibility/2006" xmlns:p14="http://schemas.microsoft.com/office/powerpoint/2010/main">
+    <mc:Choice Requires="p14">
       <p:transition spd="slow" p14:dur="2000"/>
     </mc:Choice>
-    <mc:Fallback>
+    <mc:Fallback xmlns="">
       <p:transition spd="slow"/>
     </mc:Fallback>
   </mc:AlternateContent>
@@ -23647,11 +23647,11 @@
   <p:clrMapOvr>
     <a:masterClrMapping/>
   </p:clrMapOvr>
-  <mc:AlternateContent xmlns:mc="http://schemas.openxmlformats.org/markup-compatibility/2006">
-    <mc:Choice xmlns:p14="http://schemas.microsoft.com/office/powerpoint/2010/main" Requires="p14">
+  <mc:AlternateContent xmlns:mc="http://schemas.openxmlformats.org/markup-compatibility/2006" xmlns:p14="http://schemas.microsoft.com/office/powerpoint/2010/main">
+    <mc:Choice Requires="p14">
       <p:transition spd="slow" p14:dur="2000"/>
     </mc:Choice>
-    <mc:Fallback>
+    <mc:Fallback xmlns="">
       <p:transition spd="slow"/>
     </mc:Fallback>
   </mc:AlternateContent>
@@ -23805,11 +23805,11 @@
   <p:clrMapOvr>
     <a:masterClrMapping/>
   </p:clrMapOvr>
-  <mc:AlternateContent xmlns:mc="http://schemas.openxmlformats.org/markup-compatibility/2006">
-    <mc:Choice xmlns:p14="http://schemas.microsoft.com/office/powerpoint/2010/main" Requires="p14">
+  <mc:AlternateContent xmlns:mc="http://schemas.openxmlformats.org/markup-compatibility/2006" xmlns:p14="http://schemas.microsoft.com/office/powerpoint/2010/main">
+    <mc:Choice Requires="p14">
       <p:transition spd="slow" p14:dur="2000"/>
     </mc:Choice>
-    <mc:Fallback>
+    <mc:Fallback xmlns="">
       <p:transition spd="slow"/>
     </mc:Fallback>
   </mc:AlternateContent>
@@ -24183,11 +24183,11 @@
   <p:clrMapOvr>
     <a:masterClrMapping/>
   </p:clrMapOvr>
-  <mc:AlternateContent xmlns:mc="http://schemas.openxmlformats.org/markup-compatibility/2006">
-    <mc:Choice xmlns:p14="http://schemas.microsoft.com/office/powerpoint/2010/main" Requires="p14">
+  <mc:AlternateContent xmlns:mc="http://schemas.openxmlformats.org/markup-compatibility/2006" xmlns:p14="http://schemas.microsoft.com/office/powerpoint/2010/main">
+    <mc:Choice Requires="p14">
       <p:transition spd="slow" p14:dur="2000"/>
     </mc:Choice>
-    <mc:Fallback>
+    <mc:Fallback xmlns="">
       <p:transition spd="slow"/>
     </mc:Fallback>
   </mc:AlternateContent>
@@ -24618,11 +24618,11 @@
   <p:clrMapOvr>
     <a:masterClrMapping/>
   </p:clrMapOvr>
-  <mc:AlternateContent xmlns:mc="http://schemas.openxmlformats.org/markup-compatibility/2006">
-    <mc:Choice xmlns:p14="http://schemas.microsoft.com/office/powerpoint/2010/main" Requires="p14">
+  <mc:AlternateContent xmlns:mc="http://schemas.openxmlformats.org/markup-compatibility/2006" xmlns:p14="http://schemas.microsoft.com/office/powerpoint/2010/main">
+    <mc:Choice Requires="p14">
       <p:transition spd="slow" p14:dur="2000"/>
     </mc:Choice>
-    <mc:Fallback>
+    <mc:Fallback xmlns="">
       <p:transition spd="slow"/>
     </mc:Fallback>
   </mc:AlternateContent>
@@ -24637,7 +24637,7 @@
 </file>
 
 <file path=ppt/slides/slide18.xml><?xml version="1.0" encoding="utf-8"?>
-<p:sld xmlns:a="http://schemas.openxmlformats.org/drawingml/2006/main" xmlns:r="http://schemas.openxmlformats.org/officeDocument/2006/relationships" xmlns:p="http://schemas.openxmlformats.org/presentationml/2006/main">
+<p:sld xmlns:a="http://schemas.openxmlformats.org/drawingml/2006/main" xmlns:r="http://schemas.openxmlformats.org/officeDocument/2006/relationships" xmlns:p="http://schemas.openxmlformats.org/presentationml/2006/main" show="0">
   <p:cSld>
     <p:spTree>
       <p:nvGrpSpPr>
@@ -24853,7 +24853,7 @@
 </file>
 
 <file path=ppt/slides/slide19.xml><?xml version="1.0" encoding="utf-8"?>
-<p:sld xmlns:a="http://schemas.openxmlformats.org/drawingml/2006/main" xmlns:r="http://schemas.openxmlformats.org/officeDocument/2006/relationships" xmlns:p="http://schemas.openxmlformats.org/presentationml/2006/main">
+<p:sld xmlns:a="http://schemas.openxmlformats.org/drawingml/2006/main" xmlns:r="http://schemas.openxmlformats.org/officeDocument/2006/relationships" xmlns:p="http://schemas.openxmlformats.org/presentationml/2006/main" show="0">
   <p:cSld>
     <p:spTree>
       <p:nvGrpSpPr>
@@ -25086,6 +25086,14 @@
   <p:clrMapOvr>
     <a:masterClrMapping/>
   </p:clrMapOvr>
+  <mc:AlternateContent xmlns:mc="http://schemas.openxmlformats.org/markup-compatibility/2006">
+    <mc:Choice xmlns:p14="http://schemas.microsoft.com/office/powerpoint/2010/main" Requires="p14">
+      <p:transition spd="slow" p14:dur="2000"/>
+    </mc:Choice>
+    <mc:Fallback>
+      <p:transition spd="slow"/>
+    </mc:Fallback>
+  </mc:AlternateContent>
   <p:timing>
     <p:tnLst>
       <p:par>
@@ -25262,11 +25270,11 @@
   <p:clrMapOvr>
     <a:masterClrMapping/>
   </p:clrMapOvr>
-  <mc:AlternateContent xmlns:mc="http://schemas.openxmlformats.org/markup-compatibility/2006">
-    <mc:Choice xmlns:p14="http://schemas.microsoft.com/office/powerpoint/2010/main" Requires="p14">
+  <mc:AlternateContent xmlns:mc="http://schemas.openxmlformats.org/markup-compatibility/2006" xmlns:p14="http://schemas.microsoft.com/office/powerpoint/2010/main">
+    <mc:Choice Requires="p14">
       <p:transition spd="slow" p14:dur="2000"/>
     </mc:Choice>
-    <mc:Fallback>
+    <mc:Fallback xmlns="">
       <p:transition spd="slow"/>
     </mc:Fallback>
   </mc:AlternateContent>
@@ -25281,7 +25289,7 @@
 </file>
 
 <file path=ppt/slides/slide20.xml><?xml version="1.0" encoding="utf-8"?>
-<p:sld xmlns:a="http://schemas.openxmlformats.org/drawingml/2006/main" xmlns:r="http://schemas.openxmlformats.org/officeDocument/2006/relationships" xmlns:p="http://schemas.openxmlformats.org/presentationml/2006/main">
+<p:sld xmlns:a="http://schemas.openxmlformats.org/drawingml/2006/main" xmlns:r="http://schemas.openxmlformats.org/officeDocument/2006/relationships" xmlns:p="http://schemas.openxmlformats.org/presentationml/2006/main" show="0">
   <p:cSld>
     <p:spTree>
       <p:nvGrpSpPr>
@@ -25481,11 +25489,19 @@
   <p:clrMapOvr>
     <a:masterClrMapping/>
   </p:clrMapOvr>
+  <mc:AlternateContent xmlns:mc="http://schemas.openxmlformats.org/markup-compatibility/2006">
+    <mc:Choice xmlns:p14="http://schemas.microsoft.com/office/powerpoint/2010/main" Requires="p14">
+      <p:transition spd="slow" p14:dur="2000"/>
+    </mc:Choice>
+    <mc:Fallback>
+      <p:transition spd="slow"/>
+    </mc:Fallback>
+  </mc:AlternateContent>
 </p:sld>
 </file>
 
 <file path=ppt/slides/slide21.xml><?xml version="1.0" encoding="utf-8"?>
-<p:sld xmlns:a="http://schemas.openxmlformats.org/drawingml/2006/main" xmlns:r="http://schemas.openxmlformats.org/officeDocument/2006/relationships" xmlns:p="http://schemas.openxmlformats.org/presentationml/2006/main">
+<p:sld xmlns:a="http://schemas.openxmlformats.org/drawingml/2006/main" xmlns:r="http://schemas.openxmlformats.org/officeDocument/2006/relationships" xmlns:p="http://schemas.openxmlformats.org/presentationml/2006/main" show="0">
   <p:cSld>
     <p:spTree>
       <p:nvGrpSpPr>
@@ -25669,6 +25685,14 @@
   <p:clrMapOvr>
     <a:masterClrMapping/>
   </p:clrMapOvr>
+  <mc:AlternateContent xmlns:mc="http://schemas.openxmlformats.org/markup-compatibility/2006">
+    <mc:Choice xmlns:p14="http://schemas.microsoft.com/office/powerpoint/2010/main" Requires="p14">
+      <p:transition spd="slow" p14:dur="2000"/>
+    </mc:Choice>
+    <mc:Fallback>
+      <p:transition spd="slow"/>
+    </mc:Fallback>
+  </mc:AlternateContent>
   <p:timing>
     <p:tnLst>
       <p:par>
@@ -25680,7 +25704,7 @@
 </file>
 
 <file path=ppt/slides/slide22.xml><?xml version="1.0" encoding="utf-8"?>
-<p:sld xmlns:a="http://schemas.openxmlformats.org/drawingml/2006/main" xmlns:r="http://schemas.openxmlformats.org/officeDocument/2006/relationships" xmlns:p="http://schemas.openxmlformats.org/presentationml/2006/main">
+<p:sld xmlns:a="http://schemas.openxmlformats.org/drawingml/2006/main" xmlns:r="http://schemas.openxmlformats.org/officeDocument/2006/relationships" xmlns:p="http://schemas.openxmlformats.org/presentationml/2006/main" show="0">
   <p:cSld>
     <p:spTree>
       <p:nvGrpSpPr>
@@ -25867,6 +25891,14 @@
   <p:clrMapOvr>
     <a:masterClrMapping/>
   </p:clrMapOvr>
+  <mc:AlternateContent xmlns:mc="http://schemas.openxmlformats.org/markup-compatibility/2006">
+    <mc:Choice xmlns:p14="http://schemas.microsoft.com/office/powerpoint/2010/main" Requires="p14">
+      <p:transition spd="slow" p14:dur="2000"/>
+    </mc:Choice>
+    <mc:Fallback>
+      <p:transition spd="slow"/>
+    </mc:Fallback>
+  </mc:AlternateContent>
   <p:timing>
     <p:tnLst>
       <p:par>
@@ -25878,7 +25910,7 @@
 </file>
 
 <file path=ppt/slides/slide23.xml><?xml version="1.0" encoding="utf-8"?>
-<p:sld xmlns:a="http://schemas.openxmlformats.org/drawingml/2006/main" xmlns:r="http://schemas.openxmlformats.org/officeDocument/2006/relationships" xmlns:p="http://schemas.openxmlformats.org/presentationml/2006/main">
+<p:sld xmlns:a="http://schemas.openxmlformats.org/drawingml/2006/main" xmlns:r="http://schemas.openxmlformats.org/officeDocument/2006/relationships" xmlns:p="http://schemas.openxmlformats.org/presentationml/2006/main" show="0">
   <p:cSld>
     <p:spTree>
       <p:nvGrpSpPr>
@@ -26057,6 +26089,14 @@
   <p:clrMapOvr>
     <a:masterClrMapping/>
   </p:clrMapOvr>
+  <mc:AlternateContent xmlns:mc="http://schemas.openxmlformats.org/markup-compatibility/2006">
+    <mc:Choice xmlns:p14="http://schemas.microsoft.com/office/powerpoint/2010/main" Requires="p14">
+      <p:transition spd="slow" p14:dur="2000"/>
+    </mc:Choice>
+    <mc:Fallback>
+      <p:transition spd="slow"/>
+    </mc:Fallback>
+  </mc:AlternateContent>
   <p:timing>
     <p:tnLst>
       <p:par>
@@ -26068,7 +26108,7 @@
 </file>
 
 <file path=ppt/slides/slide24.xml><?xml version="1.0" encoding="utf-8"?>
-<p:sld xmlns:a="http://schemas.openxmlformats.org/drawingml/2006/main" xmlns:r="http://schemas.openxmlformats.org/officeDocument/2006/relationships" xmlns:p="http://schemas.openxmlformats.org/presentationml/2006/main">
+<p:sld xmlns:a="http://schemas.openxmlformats.org/drawingml/2006/main" xmlns:r="http://schemas.openxmlformats.org/officeDocument/2006/relationships" xmlns:p="http://schemas.openxmlformats.org/presentationml/2006/main" show="0">
   <p:cSld>
     <p:spTree>
       <p:nvGrpSpPr>
@@ -26451,6 +26491,14 @@
   <p:clrMapOvr>
     <a:masterClrMapping/>
   </p:clrMapOvr>
+  <mc:AlternateContent xmlns:mc="http://schemas.openxmlformats.org/markup-compatibility/2006">
+    <mc:Choice xmlns:p14="http://schemas.microsoft.com/office/powerpoint/2010/main" Requires="p14">
+      <p:transition spd="slow" p14:dur="2000"/>
+    </mc:Choice>
+    <mc:Fallback>
+      <p:transition spd="slow"/>
+    </mc:Fallback>
+  </mc:AlternateContent>
   <p:timing>
     <p:tnLst>
       <p:par>
@@ -26462,7 +26510,7 @@
 </file>
 
 <file path=ppt/slides/slide25.xml><?xml version="1.0" encoding="utf-8"?>
-<p:sld xmlns:a="http://schemas.openxmlformats.org/drawingml/2006/main" xmlns:r="http://schemas.openxmlformats.org/officeDocument/2006/relationships" xmlns:p="http://schemas.openxmlformats.org/presentationml/2006/main">
+<p:sld xmlns:a="http://schemas.openxmlformats.org/drawingml/2006/main" xmlns:r="http://schemas.openxmlformats.org/officeDocument/2006/relationships" xmlns:p="http://schemas.openxmlformats.org/presentationml/2006/main" show="0">
   <p:cSld>
     <p:spTree>
       <p:nvGrpSpPr>
@@ -26833,6 +26881,14 @@
   <p:clrMapOvr>
     <a:masterClrMapping/>
   </p:clrMapOvr>
+  <mc:AlternateContent xmlns:mc="http://schemas.openxmlformats.org/markup-compatibility/2006">
+    <mc:Choice xmlns:p14="http://schemas.microsoft.com/office/powerpoint/2010/main" Requires="p14">
+      <p:transition spd="slow" p14:dur="2000"/>
+    </mc:Choice>
+    <mc:Fallback>
+      <p:transition spd="slow"/>
+    </mc:Fallback>
+  </mc:AlternateContent>
   <p:timing>
     <p:tnLst>
       <p:par>
@@ -26844,7 +26900,7 @@
 </file>
 
 <file path=ppt/slides/slide26.xml><?xml version="1.0" encoding="utf-8"?>
-<p:sld xmlns:a="http://schemas.openxmlformats.org/drawingml/2006/main" xmlns:r="http://schemas.openxmlformats.org/officeDocument/2006/relationships" xmlns:p="http://schemas.openxmlformats.org/presentationml/2006/main">
+<p:sld xmlns:a="http://schemas.openxmlformats.org/drawingml/2006/main" xmlns:r="http://schemas.openxmlformats.org/officeDocument/2006/relationships" xmlns:p="http://schemas.openxmlformats.org/presentationml/2006/main" show="0">
   <p:cSld>
     <p:spTree>
       <p:nvGrpSpPr>
@@ -27889,6 +27945,14 @@
   <p:clrMapOvr>
     <a:masterClrMapping/>
   </p:clrMapOvr>
+  <mc:AlternateContent xmlns:mc="http://schemas.openxmlformats.org/markup-compatibility/2006">
+    <mc:Choice xmlns:p14="http://schemas.microsoft.com/office/powerpoint/2010/main" Requires="p14">
+      <p:transition spd="slow" p14:dur="2000"/>
+    </mc:Choice>
+    <mc:Fallback>
+      <p:transition spd="slow"/>
+    </mc:Fallback>
+  </mc:AlternateContent>
   <p:timing>
     <p:tnLst>
       <p:par>
@@ -27900,7 +27964,7 @@
 </file>
 
 <file path=ppt/slides/slide27.xml><?xml version="1.0" encoding="utf-8"?>
-<p:sld xmlns:a="http://schemas.openxmlformats.org/drawingml/2006/main" xmlns:r="http://schemas.openxmlformats.org/officeDocument/2006/relationships" xmlns:p="http://schemas.openxmlformats.org/presentationml/2006/main">
+<p:sld xmlns:a="http://schemas.openxmlformats.org/drawingml/2006/main" xmlns:r="http://schemas.openxmlformats.org/officeDocument/2006/relationships" xmlns:p="http://schemas.openxmlformats.org/presentationml/2006/main" show="0">
   <p:cSld>
     <p:spTree>
       <p:nvGrpSpPr>
@@ -28075,6 +28139,14 @@
   <p:clrMapOvr>
     <a:masterClrMapping/>
   </p:clrMapOvr>
+  <mc:AlternateContent xmlns:mc="http://schemas.openxmlformats.org/markup-compatibility/2006">
+    <mc:Choice xmlns:p14="http://schemas.microsoft.com/office/powerpoint/2010/main" Requires="p14">
+      <p:transition spd="slow" p14:dur="2000"/>
+    </mc:Choice>
+    <mc:Fallback>
+      <p:transition spd="slow"/>
+    </mc:Fallback>
+  </mc:AlternateContent>
   <p:timing>
     <p:tnLst>
       <p:par>
@@ -28931,11 +29003,11 @@
   <p:clrMapOvr>
     <a:masterClrMapping/>
   </p:clrMapOvr>
-  <mc:AlternateContent xmlns:mc="http://schemas.openxmlformats.org/markup-compatibility/2006">
-    <mc:Choice xmlns:p14="http://schemas.microsoft.com/office/powerpoint/2010/main" Requires="p14">
+  <mc:AlternateContent xmlns:mc="http://schemas.openxmlformats.org/markup-compatibility/2006" xmlns:p14="http://schemas.microsoft.com/office/powerpoint/2010/main">
+    <mc:Choice Requires="p14">
       <p:transition spd="slow" p14:dur="2000"/>
     </mc:Choice>
-    <mc:Fallback>
+    <mc:Fallback xmlns="">
       <p:transition spd="slow"/>
     </mc:Fallback>
   </mc:AlternateContent>
@@ -32781,11 +32853,11 @@
   <p:clrMapOvr>
     <a:masterClrMapping/>
   </p:clrMapOvr>
-  <mc:AlternateContent xmlns:mc="http://schemas.openxmlformats.org/markup-compatibility/2006">
-    <mc:Choice xmlns:p14="http://schemas.microsoft.com/office/powerpoint/2010/main" Requires="p14">
+  <mc:AlternateContent xmlns:mc="http://schemas.openxmlformats.org/markup-compatibility/2006" xmlns:p14="http://schemas.microsoft.com/office/powerpoint/2010/main">
+    <mc:Choice Requires="p14">
       <p:transition spd="slow" p14:dur="2000"/>
     </mc:Choice>
-    <mc:Fallback>
+    <mc:Fallback xmlns="">
       <p:transition spd="slow"/>
     </mc:Fallback>
   </mc:AlternateContent>
@@ -35794,11 +35866,11 @@
   <p:clrMapOvr>
     <a:masterClrMapping/>
   </p:clrMapOvr>
-  <mc:AlternateContent xmlns:mc="http://schemas.openxmlformats.org/markup-compatibility/2006">
-    <mc:Choice xmlns:p14="http://schemas.microsoft.com/office/powerpoint/2010/main" Requires="p14">
+  <mc:AlternateContent xmlns:mc="http://schemas.openxmlformats.org/markup-compatibility/2006" xmlns:p14="http://schemas.microsoft.com/office/powerpoint/2010/main">
+    <mc:Choice Requires="p14">
       <p:transition spd="slow" p14:dur="2000"/>
     </mc:Choice>
-    <mc:Fallback>
+    <mc:Fallback xmlns="">
       <p:transition spd="slow"/>
     </mc:Fallback>
   </mc:AlternateContent>
@@ -37622,11 +37694,11 @@
   <p:clrMapOvr>
     <a:masterClrMapping/>
   </p:clrMapOvr>
-  <mc:AlternateContent xmlns:mc="http://schemas.openxmlformats.org/markup-compatibility/2006">
-    <mc:Choice xmlns:p14="http://schemas.microsoft.com/office/powerpoint/2010/main" Requires="p14">
+  <mc:AlternateContent xmlns:mc="http://schemas.openxmlformats.org/markup-compatibility/2006" xmlns:p14="http://schemas.microsoft.com/office/powerpoint/2010/main">
+    <mc:Choice Requires="p14">
       <p:transition spd="slow" p14:dur="2000"/>
     </mc:Choice>
-    <mc:Fallback>
+    <mc:Fallback xmlns="">
       <p:transition spd="slow"/>
     </mc:Fallback>
   </mc:AlternateContent>
@@ -38742,11 +38814,11 @@
   <p:clrMapOvr>
     <a:masterClrMapping/>
   </p:clrMapOvr>
-  <mc:AlternateContent xmlns:mc="http://schemas.openxmlformats.org/markup-compatibility/2006">
-    <mc:Choice xmlns:p14="http://schemas.microsoft.com/office/powerpoint/2010/main" Requires="p14">
+  <mc:AlternateContent xmlns:mc="http://schemas.openxmlformats.org/markup-compatibility/2006" xmlns:p14="http://schemas.microsoft.com/office/powerpoint/2010/main">
+    <mc:Choice Requires="p14">
       <p:transition spd="slow" p14:dur="2000"/>
     </mc:Choice>
-    <mc:Fallback>
+    <mc:Fallback xmlns="">
       <p:transition spd="slow"/>
     </mc:Fallback>
   </mc:AlternateContent>
@@ -38927,11 +38999,11 @@
   <p:clrMapOvr>
     <a:masterClrMapping/>
   </p:clrMapOvr>
-  <mc:AlternateContent xmlns:mc="http://schemas.openxmlformats.org/markup-compatibility/2006">
-    <mc:Choice xmlns:p14="http://schemas.microsoft.com/office/powerpoint/2010/main" Requires="p14">
+  <mc:AlternateContent xmlns:mc="http://schemas.openxmlformats.org/markup-compatibility/2006" xmlns:p14="http://schemas.microsoft.com/office/powerpoint/2010/main">
+    <mc:Choice Requires="p14">
       <p:transition spd="slow" p14:dur="2000"/>
     </mc:Choice>
-    <mc:Fallback>
+    <mc:Fallback xmlns="">
       <p:transition spd="slow"/>
     </mc:Fallback>
   </mc:AlternateContent>
@@ -39224,11 +39296,11 @@
   <p:clrMapOvr>
     <a:masterClrMapping/>
   </p:clrMapOvr>
-  <mc:AlternateContent xmlns:mc="http://schemas.openxmlformats.org/markup-compatibility/2006">
-    <mc:Choice xmlns:p14="http://schemas.microsoft.com/office/powerpoint/2010/main" Requires="p14">
+  <mc:AlternateContent xmlns:mc="http://schemas.openxmlformats.org/markup-compatibility/2006" xmlns:p14="http://schemas.microsoft.com/office/powerpoint/2010/main">
+    <mc:Choice Requires="p14">
       <p:transition spd="slow" p14:dur="2000"/>
     </mc:Choice>
-    <mc:Fallback>
+    <mc:Fallback xmlns="">
       <p:transition spd="slow"/>
     </mc:Fallback>
   </mc:AlternateContent>

</xml_diff>

<commit_message>
actualizacion de la ppt jornada jueves 2016-04-08
</commit_message>
<xml_diff>
--- a/Presentaciones/3 - Capacitacion MVC.PPTX
+++ b/Presentaciones/3 - Capacitacion MVC.PPTX
@@ -279,7 +279,7 @@
           <a:p>
             <a:fld id="{28529363-3187-4C19-A72D-75CA2BA8E726}" type="datetimeFigureOut">
               <a:rPr lang="en-US" smtClean="0"/>
-              <a:t>4/6/2016</a:t>
+              <a:t>4/8/2016</a:t>
             </a:fld>
             <a:endParaRPr lang="en-US" dirty="0"/>
           </a:p>
@@ -24834,11 +24834,11 @@
   <p:clrMapOvr>
     <a:masterClrMapping/>
   </p:clrMapOvr>
-  <mc:AlternateContent xmlns:mc="http://schemas.openxmlformats.org/markup-compatibility/2006">
-    <mc:Choice xmlns:p14="http://schemas.microsoft.com/office/powerpoint/2010/main" Requires="p14">
+  <mc:AlternateContent xmlns:mc="http://schemas.openxmlformats.org/markup-compatibility/2006" xmlns:p14="http://schemas.microsoft.com/office/powerpoint/2010/main">
+    <mc:Choice Requires="p14">
       <p:transition spd="slow" p14:dur="2000"/>
     </mc:Choice>
-    <mc:Fallback>
+    <mc:Fallback xmlns="">
       <p:transition spd="slow"/>
     </mc:Fallback>
   </mc:AlternateContent>
@@ -25086,11 +25086,11 @@
   <p:clrMapOvr>
     <a:masterClrMapping/>
   </p:clrMapOvr>
-  <mc:AlternateContent xmlns:mc="http://schemas.openxmlformats.org/markup-compatibility/2006">
-    <mc:Choice xmlns:p14="http://schemas.microsoft.com/office/powerpoint/2010/main" Requires="p14">
+  <mc:AlternateContent xmlns:mc="http://schemas.openxmlformats.org/markup-compatibility/2006" xmlns:p14="http://schemas.microsoft.com/office/powerpoint/2010/main">
+    <mc:Choice Requires="p14">
       <p:transition spd="slow" p14:dur="2000"/>
     </mc:Choice>
-    <mc:Fallback>
+    <mc:Fallback xmlns="">
       <p:transition spd="slow"/>
     </mc:Fallback>
   </mc:AlternateContent>
@@ -25489,11 +25489,11 @@
   <p:clrMapOvr>
     <a:masterClrMapping/>
   </p:clrMapOvr>
-  <mc:AlternateContent xmlns:mc="http://schemas.openxmlformats.org/markup-compatibility/2006">
-    <mc:Choice xmlns:p14="http://schemas.microsoft.com/office/powerpoint/2010/main" Requires="p14">
+  <mc:AlternateContent xmlns:mc="http://schemas.openxmlformats.org/markup-compatibility/2006" xmlns:p14="http://schemas.microsoft.com/office/powerpoint/2010/main">
+    <mc:Choice Requires="p14">
       <p:transition spd="slow" p14:dur="2000"/>
     </mc:Choice>
-    <mc:Fallback>
+    <mc:Fallback xmlns="">
       <p:transition spd="slow"/>
     </mc:Fallback>
   </mc:AlternateContent>
@@ -25685,11 +25685,11 @@
   <p:clrMapOvr>
     <a:masterClrMapping/>
   </p:clrMapOvr>
-  <mc:AlternateContent xmlns:mc="http://schemas.openxmlformats.org/markup-compatibility/2006">
-    <mc:Choice xmlns:p14="http://schemas.microsoft.com/office/powerpoint/2010/main" Requires="p14">
+  <mc:AlternateContent xmlns:mc="http://schemas.openxmlformats.org/markup-compatibility/2006" xmlns:p14="http://schemas.microsoft.com/office/powerpoint/2010/main">
+    <mc:Choice Requires="p14">
       <p:transition spd="slow" p14:dur="2000"/>
     </mc:Choice>
-    <mc:Fallback>
+    <mc:Fallback xmlns="">
       <p:transition spd="slow"/>
     </mc:Fallback>
   </mc:AlternateContent>
@@ -25891,11 +25891,11 @@
   <p:clrMapOvr>
     <a:masterClrMapping/>
   </p:clrMapOvr>
-  <mc:AlternateContent xmlns:mc="http://schemas.openxmlformats.org/markup-compatibility/2006">
-    <mc:Choice xmlns:p14="http://schemas.microsoft.com/office/powerpoint/2010/main" Requires="p14">
+  <mc:AlternateContent xmlns:mc="http://schemas.openxmlformats.org/markup-compatibility/2006" xmlns:p14="http://schemas.microsoft.com/office/powerpoint/2010/main">
+    <mc:Choice Requires="p14">
       <p:transition spd="slow" p14:dur="2000"/>
     </mc:Choice>
-    <mc:Fallback>
+    <mc:Fallback xmlns="">
       <p:transition spd="slow"/>
     </mc:Fallback>
   </mc:AlternateContent>
@@ -26089,11 +26089,11 @@
   <p:clrMapOvr>
     <a:masterClrMapping/>
   </p:clrMapOvr>
-  <mc:AlternateContent xmlns:mc="http://schemas.openxmlformats.org/markup-compatibility/2006">
-    <mc:Choice xmlns:p14="http://schemas.microsoft.com/office/powerpoint/2010/main" Requires="p14">
+  <mc:AlternateContent xmlns:mc="http://schemas.openxmlformats.org/markup-compatibility/2006" xmlns:p14="http://schemas.microsoft.com/office/powerpoint/2010/main">
+    <mc:Choice Requires="p14">
       <p:transition spd="slow" p14:dur="2000"/>
     </mc:Choice>
-    <mc:Fallback>
+    <mc:Fallback xmlns="">
       <p:transition spd="slow"/>
     </mc:Fallback>
   </mc:AlternateContent>
@@ -26491,11 +26491,11 @@
   <p:clrMapOvr>
     <a:masterClrMapping/>
   </p:clrMapOvr>
-  <mc:AlternateContent xmlns:mc="http://schemas.openxmlformats.org/markup-compatibility/2006">
-    <mc:Choice xmlns:p14="http://schemas.microsoft.com/office/powerpoint/2010/main" Requires="p14">
+  <mc:AlternateContent xmlns:mc="http://schemas.openxmlformats.org/markup-compatibility/2006" xmlns:p14="http://schemas.microsoft.com/office/powerpoint/2010/main">
+    <mc:Choice Requires="p14">
       <p:transition spd="slow" p14:dur="2000"/>
     </mc:Choice>
-    <mc:Fallback>
+    <mc:Fallback xmlns="">
       <p:transition spd="slow"/>
     </mc:Fallback>
   </mc:AlternateContent>
@@ -26881,11 +26881,11 @@
   <p:clrMapOvr>
     <a:masterClrMapping/>
   </p:clrMapOvr>
-  <mc:AlternateContent xmlns:mc="http://schemas.openxmlformats.org/markup-compatibility/2006">
-    <mc:Choice xmlns:p14="http://schemas.microsoft.com/office/powerpoint/2010/main" Requires="p14">
+  <mc:AlternateContent xmlns:mc="http://schemas.openxmlformats.org/markup-compatibility/2006" xmlns:p14="http://schemas.microsoft.com/office/powerpoint/2010/main">
+    <mc:Choice Requires="p14">
       <p:transition spd="slow" p14:dur="2000"/>
     </mc:Choice>
-    <mc:Fallback>
+    <mc:Fallback xmlns="">
       <p:transition spd="slow"/>
     </mc:Fallback>
   </mc:AlternateContent>
@@ -27945,11 +27945,11 @@
   <p:clrMapOvr>
     <a:masterClrMapping/>
   </p:clrMapOvr>
-  <mc:AlternateContent xmlns:mc="http://schemas.openxmlformats.org/markup-compatibility/2006">
-    <mc:Choice xmlns:p14="http://schemas.microsoft.com/office/powerpoint/2010/main" Requires="p14">
+  <mc:AlternateContent xmlns:mc="http://schemas.openxmlformats.org/markup-compatibility/2006" xmlns:p14="http://schemas.microsoft.com/office/powerpoint/2010/main">
+    <mc:Choice Requires="p14">
       <p:transition spd="slow" p14:dur="2000"/>
     </mc:Choice>
-    <mc:Fallback>
+    <mc:Fallback xmlns="">
       <p:transition spd="slow"/>
     </mc:Fallback>
   </mc:AlternateContent>
@@ -28139,11 +28139,11 @@
   <p:clrMapOvr>
     <a:masterClrMapping/>
   </p:clrMapOvr>
-  <mc:AlternateContent xmlns:mc="http://schemas.openxmlformats.org/markup-compatibility/2006">
-    <mc:Choice xmlns:p14="http://schemas.microsoft.com/office/powerpoint/2010/main" Requires="p14">
+  <mc:AlternateContent xmlns:mc="http://schemas.openxmlformats.org/markup-compatibility/2006" xmlns:p14="http://schemas.microsoft.com/office/powerpoint/2010/main">
+    <mc:Choice Requires="p14">
       <p:transition spd="slow" p14:dur="2000"/>
     </mc:Choice>
-    <mc:Fallback>
+    <mc:Fallback xmlns="">
       <p:transition spd="slow"/>
     </mc:Fallback>
   </mc:AlternateContent>
@@ -28158,7 +28158,7 @@
 </file>
 
 <file path=ppt/slides/slide28.xml><?xml version="1.0" encoding="utf-8"?>
-<p:sld xmlns:a="http://schemas.openxmlformats.org/drawingml/2006/main" xmlns:r="http://schemas.openxmlformats.org/officeDocument/2006/relationships" xmlns:p="http://schemas.openxmlformats.org/presentationml/2006/main">
+<p:sld xmlns:a="http://schemas.openxmlformats.org/drawingml/2006/main" xmlns:r="http://schemas.openxmlformats.org/officeDocument/2006/relationships" xmlns:p="http://schemas.openxmlformats.org/presentationml/2006/main" show="0">
   <p:cSld>
     <p:spTree>
       <p:nvGrpSpPr>
@@ -28753,6 +28753,14 @@
   <p:clrMapOvr>
     <a:masterClrMapping/>
   </p:clrMapOvr>
+  <mc:AlternateContent xmlns:mc="http://schemas.openxmlformats.org/markup-compatibility/2006" xmlns:p14="http://schemas.microsoft.com/office/powerpoint/2010/main">
+    <mc:Choice Requires="p14">
+      <p:transition spd="slow" p14:dur="2000"/>
+    </mc:Choice>
+    <mc:Fallback xmlns="">
+      <p:transition spd="slow"/>
+    </mc:Fallback>
+  </mc:AlternateContent>
   <p:timing>
     <p:tnLst>
       <p:par>
@@ -28764,7 +28772,7 @@
 </file>
 
 <file path=ppt/slides/slide29.xml><?xml version="1.0" encoding="utf-8"?>
-<p:sld xmlns:a="http://schemas.openxmlformats.org/drawingml/2006/main" xmlns:r="http://schemas.openxmlformats.org/officeDocument/2006/relationships" xmlns:p="http://schemas.openxmlformats.org/presentationml/2006/main">
+<p:sld xmlns:a="http://schemas.openxmlformats.org/drawingml/2006/main" xmlns:r="http://schemas.openxmlformats.org/officeDocument/2006/relationships" xmlns:p="http://schemas.openxmlformats.org/presentationml/2006/main" show="0">
   <p:cSld>
     <p:spTree>
       <p:nvGrpSpPr>
@@ -28913,6 +28921,14 @@
   <p:clrMapOvr>
     <a:masterClrMapping/>
   </p:clrMapOvr>
+  <mc:AlternateContent xmlns:mc="http://schemas.openxmlformats.org/markup-compatibility/2006" xmlns:p14="http://schemas.microsoft.com/office/powerpoint/2010/main">
+    <mc:Choice Requires="p14">
+      <p:transition spd="slow" p14:dur="2000"/>
+    </mc:Choice>
+    <mc:Fallback xmlns="">
+      <p:transition spd="slow"/>
+    </mc:Fallback>
+  </mc:AlternateContent>
   <p:timing>
     <p:tnLst>
       <p:par>
@@ -29022,7 +29038,7 @@
 </file>
 
 <file path=ppt/slides/slide30.xml><?xml version="1.0" encoding="utf-8"?>
-<p:sld xmlns:a="http://schemas.openxmlformats.org/drawingml/2006/main" xmlns:r="http://schemas.openxmlformats.org/officeDocument/2006/relationships" xmlns:p="http://schemas.openxmlformats.org/presentationml/2006/main">
+<p:sld xmlns:a="http://schemas.openxmlformats.org/drawingml/2006/main" xmlns:r="http://schemas.openxmlformats.org/officeDocument/2006/relationships" xmlns:p="http://schemas.openxmlformats.org/presentationml/2006/main" show="0">
   <p:cSld>
     <p:spTree>
       <p:nvGrpSpPr>
@@ -29299,6 +29315,14 @@
   <p:clrMapOvr>
     <a:masterClrMapping/>
   </p:clrMapOvr>
+  <mc:AlternateContent xmlns:mc="http://schemas.openxmlformats.org/markup-compatibility/2006" xmlns:p14="http://schemas.microsoft.com/office/powerpoint/2010/main">
+    <mc:Choice Requires="p14">
+      <p:transition spd="slow" p14:dur="2000"/>
+    </mc:Choice>
+    <mc:Fallback xmlns="">
+      <p:transition spd="slow"/>
+    </mc:Fallback>
+  </mc:AlternateContent>
   <p:timing>
     <p:tnLst>
       <p:par>
@@ -29310,7 +29334,7 @@
 </file>
 
 <file path=ppt/slides/slide31.xml><?xml version="1.0" encoding="utf-8"?>
-<p:sld xmlns:a="http://schemas.openxmlformats.org/drawingml/2006/main" xmlns:r="http://schemas.openxmlformats.org/officeDocument/2006/relationships" xmlns:p="http://schemas.openxmlformats.org/presentationml/2006/main">
+<p:sld xmlns:a="http://schemas.openxmlformats.org/drawingml/2006/main" xmlns:r="http://schemas.openxmlformats.org/officeDocument/2006/relationships" xmlns:p="http://schemas.openxmlformats.org/presentationml/2006/main" show="0">
   <p:cSld>
     <p:spTree>
       <p:nvGrpSpPr>
@@ -29445,6 +29469,14 @@
   <p:clrMapOvr>
     <a:masterClrMapping/>
   </p:clrMapOvr>
+  <mc:AlternateContent xmlns:mc="http://schemas.openxmlformats.org/markup-compatibility/2006" xmlns:p14="http://schemas.microsoft.com/office/powerpoint/2010/main">
+    <mc:Choice Requires="p14">
+      <p:transition spd="slow" p14:dur="2000"/>
+    </mc:Choice>
+    <mc:Fallback xmlns="">
+      <p:transition spd="slow"/>
+    </mc:Fallback>
+  </mc:AlternateContent>
   <p:timing>
     <p:tnLst>
       <p:par>
@@ -29456,7 +29488,7 @@
 </file>
 
 <file path=ppt/slides/slide32.xml><?xml version="1.0" encoding="utf-8"?>
-<p:sld xmlns:a="http://schemas.openxmlformats.org/drawingml/2006/main" xmlns:r="http://schemas.openxmlformats.org/officeDocument/2006/relationships" xmlns:p="http://schemas.openxmlformats.org/presentationml/2006/main">
+<p:sld xmlns:a="http://schemas.openxmlformats.org/drawingml/2006/main" xmlns:r="http://schemas.openxmlformats.org/officeDocument/2006/relationships" xmlns:p="http://schemas.openxmlformats.org/presentationml/2006/main" show="0">
   <p:cSld>
     <p:spTree>
       <p:nvGrpSpPr>
@@ -29593,8 +29625,47 @@
               <a:t>: </a:t>
             </a:r>
             <a:r>
-              <a:rPr lang="es-AR" sz="2000" dirty="0" err="1"/>
+              <a:rPr lang="es-AR" sz="2000" dirty="0" err="1" smtClean="0"/>
               <a:t>enable-migrations</a:t>
+            </a:r>
+            <a:endParaRPr lang="es-AR" sz="2000" dirty="0" smtClean="0"/>
+          </a:p>
+          <a:p>
+            <a:r>
+              <a:rPr lang="es-AR" sz="2000" dirty="0" smtClean="0"/>
+              <a:t>Para generar el primer </a:t>
+            </a:r>
+            <a:r>
+              <a:rPr lang="es-AR" sz="2000" dirty="0" err="1" smtClean="0"/>
+              <a:t>migration</a:t>
+            </a:r>
+            <a:r>
+              <a:rPr lang="es-AR" sz="2000" dirty="0" smtClean="0"/>
+              <a:t>: </a:t>
+            </a:r>
+            <a:r>
+              <a:rPr lang="es-AR" sz="2000" dirty="0" err="1" smtClean="0"/>
+              <a:t>add-migration</a:t>
+            </a:r>
+            <a:r>
+              <a:rPr lang="es-AR" sz="2000" dirty="0" smtClean="0"/>
+              <a:t> + “nombre”, por ejemplo: “</a:t>
+            </a:r>
+            <a:r>
+              <a:rPr lang="es-AR" sz="2000" dirty="0" err="1" smtClean="0"/>
+              <a:t>Inicialize</a:t>
+            </a:r>
+            <a:r>
+              <a:rPr lang="es-AR" sz="2000" dirty="0" smtClean="0"/>
+              <a:t> </a:t>
+            </a:r>
+            <a:r>
+              <a:rPr lang="es-AR" sz="2000" dirty="0" err="1" smtClean="0"/>
+              <a:t>Database</a:t>
+            </a:r>
+            <a:r>
+              <a:rPr lang="es-AR" sz="2000" dirty="0" smtClean="0"/>
+              <a:t>”</a:t>
             </a:r>
             <a:endParaRPr lang="es-AR" sz="2000" dirty="0"/>
           </a:p>
@@ -29624,6 +29695,14 @@
   <p:clrMapOvr>
     <a:masterClrMapping/>
   </p:clrMapOvr>
+  <mc:AlternateContent xmlns:mc="http://schemas.openxmlformats.org/markup-compatibility/2006" xmlns:p14="http://schemas.microsoft.com/office/powerpoint/2010/main">
+    <mc:Choice Requires="p14">
+      <p:transition spd="slow" p14:dur="2000"/>
+    </mc:Choice>
+    <mc:Fallback xmlns="">
+      <p:transition spd="slow"/>
+    </mc:Fallback>
+  </mc:AlternateContent>
   <p:timing>
     <p:tnLst>
       <p:par>
@@ -29635,7 +29714,7 @@
 </file>
 
 <file path=ppt/slides/slide33.xml><?xml version="1.0" encoding="utf-8"?>
-<p:sld xmlns:a="http://schemas.openxmlformats.org/drawingml/2006/main" xmlns:r="http://schemas.openxmlformats.org/officeDocument/2006/relationships" xmlns:p="http://schemas.openxmlformats.org/presentationml/2006/main">
+<p:sld xmlns:a="http://schemas.openxmlformats.org/drawingml/2006/main" xmlns:r="http://schemas.openxmlformats.org/officeDocument/2006/relationships" xmlns:p="http://schemas.openxmlformats.org/presentationml/2006/main" show="0">
   <p:cSld>
     <p:spTree>
       <p:nvGrpSpPr>
@@ -30508,6 +30587,14 @@
   <p:clrMapOvr>
     <a:masterClrMapping/>
   </p:clrMapOvr>
+  <mc:AlternateContent xmlns:mc="http://schemas.openxmlformats.org/markup-compatibility/2006" xmlns:p14="http://schemas.microsoft.com/office/powerpoint/2010/main">
+    <mc:Choice Requires="p14">
+      <p:transition spd="slow" p14:dur="2000"/>
+    </mc:Choice>
+    <mc:Fallback xmlns="">
+      <p:transition spd="slow"/>
+    </mc:Fallback>
+  </mc:AlternateContent>
   <p:timing>
     <p:tnLst>
       <p:par>
@@ -30519,7 +30606,7 @@
 </file>
 
 <file path=ppt/slides/slide34.xml><?xml version="1.0" encoding="utf-8"?>
-<p:sld xmlns:a="http://schemas.openxmlformats.org/drawingml/2006/main" xmlns:r="http://schemas.openxmlformats.org/officeDocument/2006/relationships" xmlns:p="http://schemas.openxmlformats.org/presentationml/2006/main">
+<p:sld xmlns:a="http://schemas.openxmlformats.org/drawingml/2006/main" xmlns:r="http://schemas.openxmlformats.org/officeDocument/2006/relationships" xmlns:p="http://schemas.openxmlformats.org/presentationml/2006/main" show="0">
   <p:cSld>
     <p:spTree>
       <p:nvGrpSpPr>
@@ -30617,8 +30704,34 @@
               <a:t>    - </a:t>
             </a:r>
             <a:r>
-              <a:rPr lang="es-AR" sz="2000" dirty="0" err="1"/>
+              <a:rPr lang="es-AR" sz="2000" dirty="0" err="1" smtClean="0"/>
               <a:t>enable-migrations</a:t>
+            </a:r>
+            <a:endParaRPr lang="es-AR" sz="2000" dirty="0" smtClean="0"/>
+          </a:p>
+          <a:p>
+            <a:pPr indent="0">
+              <a:buNone/>
+            </a:pPr>
+            <a:r>
+              <a:rPr lang="es-AR" sz="2000" dirty="0"/>
+              <a:t> </a:t>
+            </a:r>
+            <a:r>
+              <a:rPr lang="es-AR" sz="2000" dirty="0" smtClean="0"/>
+              <a:t>   </a:t>
+            </a:r>
+            <a:r>
+              <a:rPr lang="es-AR" sz="2000" dirty="0"/>
+              <a:t>- </a:t>
+            </a:r>
+            <a:r>
+              <a:rPr lang="es-AR" sz="2000" dirty="0" err="1" smtClean="0"/>
+              <a:t>add-migration</a:t>
+            </a:r>
+            <a:r>
+              <a:rPr lang="es-AR" sz="2000" dirty="0" smtClean="0"/>
+              <a:t> + “nombre”</a:t>
             </a:r>
             <a:endParaRPr lang="es-AR" sz="2000" dirty="0"/>
           </a:p>
@@ -30698,6 +30811,14 @@
   <p:clrMapOvr>
     <a:masterClrMapping/>
   </p:clrMapOvr>
+  <mc:AlternateContent xmlns:mc="http://schemas.openxmlformats.org/markup-compatibility/2006" xmlns:p14="http://schemas.microsoft.com/office/powerpoint/2010/main">
+    <mc:Choice Requires="p14">
+      <p:transition spd="slow" p14:dur="2000"/>
+    </mc:Choice>
+    <mc:Fallback xmlns="">
+      <p:transition spd="slow"/>
+    </mc:Fallback>
+  </mc:AlternateContent>
   <p:timing>
     <p:tnLst>
       <p:par>
@@ -30709,7 +30830,7 @@
 </file>
 
 <file path=ppt/slides/slide35.xml><?xml version="1.0" encoding="utf-8"?>
-<p:sld xmlns:a="http://schemas.openxmlformats.org/drawingml/2006/main" xmlns:r="http://schemas.openxmlformats.org/officeDocument/2006/relationships" xmlns:p="http://schemas.openxmlformats.org/presentationml/2006/main">
+<p:sld xmlns:a="http://schemas.openxmlformats.org/drawingml/2006/main" xmlns:r="http://schemas.openxmlformats.org/officeDocument/2006/relationships" xmlns:p="http://schemas.openxmlformats.org/presentationml/2006/main" show="0">
   <p:cSld>
     <p:spTree>
       <p:nvGrpSpPr>
@@ -30880,6 +31001,14 @@
   <p:clrMapOvr>
     <a:masterClrMapping/>
   </p:clrMapOvr>
+  <mc:AlternateContent xmlns:mc="http://schemas.openxmlformats.org/markup-compatibility/2006" xmlns:p14="http://schemas.microsoft.com/office/powerpoint/2010/main">
+    <mc:Choice Requires="p14">
+      <p:transition spd="slow" p14:dur="2000"/>
+    </mc:Choice>
+    <mc:Fallback xmlns="">
+      <p:transition spd="slow"/>
+    </mc:Fallback>
+  </mc:AlternateContent>
   <p:timing>
     <p:tnLst>
       <p:par>
@@ -30891,7 +31020,7 @@
 </file>
 
 <file path=ppt/slides/slide36.xml><?xml version="1.0" encoding="utf-8"?>
-<p:sld xmlns:a="http://schemas.openxmlformats.org/drawingml/2006/main" xmlns:r="http://schemas.openxmlformats.org/officeDocument/2006/relationships" xmlns:p="http://schemas.openxmlformats.org/presentationml/2006/main">
+<p:sld xmlns:a="http://schemas.openxmlformats.org/drawingml/2006/main" xmlns:r="http://schemas.openxmlformats.org/officeDocument/2006/relationships" xmlns:p="http://schemas.openxmlformats.org/presentationml/2006/main" show="0">
   <p:cSld>
     <p:spTree>
       <p:nvGrpSpPr>
@@ -32243,6 +32372,14 @@
   <p:clrMapOvr>
     <a:masterClrMapping/>
   </p:clrMapOvr>
+  <mc:AlternateContent xmlns:mc="http://schemas.openxmlformats.org/markup-compatibility/2006" xmlns:p14="http://schemas.microsoft.com/office/powerpoint/2010/main">
+    <mc:Choice Requires="p14">
+      <p:transition spd="slow" p14:dur="2000"/>
+    </mc:Choice>
+    <mc:Fallback xmlns="">
+      <p:transition spd="slow"/>
+    </mc:Fallback>
+  </mc:AlternateContent>
   <p:timing>
     <p:tnLst>
       <p:par>
@@ -32254,7 +32391,7 @@
 </file>
 
 <file path=ppt/slides/slide37.xml><?xml version="1.0" encoding="utf-8"?>
-<p:sld xmlns:a="http://schemas.openxmlformats.org/drawingml/2006/main" xmlns:r="http://schemas.openxmlformats.org/officeDocument/2006/relationships" xmlns:p="http://schemas.openxmlformats.org/presentationml/2006/main">
+<p:sld xmlns:a="http://schemas.openxmlformats.org/drawingml/2006/main" xmlns:r="http://schemas.openxmlformats.org/officeDocument/2006/relationships" xmlns:p="http://schemas.openxmlformats.org/presentationml/2006/main" show="0">
   <p:cSld>
     <p:spTree>
       <p:nvGrpSpPr>
@@ -32487,6 +32624,14 @@
   <p:clrMapOvr>
     <a:masterClrMapping/>
   </p:clrMapOvr>
+  <mc:AlternateContent xmlns:mc="http://schemas.openxmlformats.org/markup-compatibility/2006" xmlns:p14="http://schemas.microsoft.com/office/powerpoint/2010/main">
+    <mc:Choice Requires="p14">
+      <p:transition spd="slow" p14:dur="2000"/>
+    </mc:Choice>
+    <mc:Fallback xmlns="">
+      <p:transition spd="slow"/>
+    </mc:Fallback>
+  </mc:AlternateContent>
   <p:timing>
     <p:tnLst>
       <p:par>
@@ -32498,7 +32643,7 @@
 </file>
 
 <file path=ppt/slides/slide38.xml><?xml version="1.0" encoding="utf-8"?>
-<p:sld xmlns:a="http://schemas.openxmlformats.org/drawingml/2006/main" xmlns:r="http://schemas.openxmlformats.org/officeDocument/2006/relationships" xmlns:p="http://schemas.openxmlformats.org/presentationml/2006/main">
+<p:sld xmlns:a="http://schemas.openxmlformats.org/drawingml/2006/main" xmlns:r="http://schemas.openxmlformats.org/officeDocument/2006/relationships" xmlns:p="http://schemas.openxmlformats.org/presentationml/2006/main" show="0">
   <p:cSld>
     <p:spTree>
       <p:nvGrpSpPr>
@@ -32620,6 +32765,14 @@
   <p:clrMapOvr>
     <a:masterClrMapping/>
   </p:clrMapOvr>
+  <mc:AlternateContent xmlns:mc="http://schemas.openxmlformats.org/markup-compatibility/2006" xmlns:p14="http://schemas.microsoft.com/office/powerpoint/2010/main">
+    <mc:Choice Requires="p14">
+      <p:transition spd="slow" p14:dur="2000"/>
+    </mc:Choice>
+    <mc:Fallback xmlns="">
+      <p:transition spd="slow"/>
+    </mc:Fallback>
+  </mc:AlternateContent>
   <p:timing>
     <p:tnLst>
       <p:par>

</xml_diff>

<commit_message>
avances clase martes 12-04
</commit_message>
<xml_diff>
--- a/Presentaciones/3 - Capacitacion MVC.PPTX
+++ b/Presentaciones/3 - Capacitacion MVC.PPTX
@@ -279,7 +279,7 @@
           <a:p>
             <a:fld id="{28529363-3187-4C19-A72D-75CA2BA8E726}" type="datetimeFigureOut">
               <a:rPr lang="en-US" smtClean="0"/>
-              <a:t>4/8/2016</a:t>
+              <a:t>4/13/2016</a:t>
             </a:fld>
             <a:endParaRPr lang="en-US" dirty="0"/>
           </a:p>
@@ -19587,11 +19587,11 @@
   <p:clrMapOvr>
     <a:masterClrMapping/>
   </p:clrMapOvr>
-  <mc:AlternateContent xmlns:mc="http://schemas.openxmlformats.org/markup-compatibility/2006" xmlns:p14="http://schemas.microsoft.com/office/powerpoint/2010/main">
-    <mc:Choice Requires="p14">
+  <mc:AlternateContent xmlns:mc="http://schemas.openxmlformats.org/markup-compatibility/2006">
+    <mc:Choice xmlns:p14="http://schemas.microsoft.com/office/powerpoint/2010/main" Requires="p14">
       <p:transition spd="slow" p14:dur="2000"/>
     </mc:Choice>
-    <mc:Fallback xmlns="">
+    <mc:Fallback>
       <p:transition spd="slow"/>
     </mc:Fallback>
   </mc:AlternateContent>
@@ -22051,11 +22051,11 @@
   <p:clrMapOvr>
     <a:masterClrMapping/>
   </p:clrMapOvr>
-  <mc:AlternateContent xmlns:mc="http://schemas.openxmlformats.org/markup-compatibility/2006" xmlns:p14="http://schemas.microsoft.com/office/powerpoint/2010/main">
-    <mc:Choice Requires="p14">
+  <mc:AlternateContent xmlns:mc="http://schemas.openxmlformats.org/markup-compatibility/2006">
+    <mc:Choice xmlns:p14="http://schemas.microsoft.com/office/powerpoint/2010/main" Requires="p14">
       <p:transition spd="slow" p14:dur="2000"/>
     </mc:Choice>
-    <mc:Fallback xmlns="">
+    <mc:Fallback>
       <p:transition spd="slow"/>
     </mc:Fallback>
   </mc:AlternateContent>
@@ -22348,11 +22348,11 @@
   <p:clrMapOvr>
     <a:masterClrMapping/>
   </p:clrMapOvr>
-  <mc:AlternateContent xmlns:mc="http://schemas.openxmlformats.org/markup-compatibility/2006" xmlns:p14="http://schemas.microsoft.com/office/powerpoint/2010/main">
-    <mc:Choice Requires="p14">
+  <mc:AlternateContent xmlns:mc="http://schemas.openxmlformats.org/markup-compatibility/2006">
+    <mc:Choice xmlns:p14="http://schemas.microsoft.com/office/powerpoint/2010/main" Requires="p14">
       <p:transition spd="slow" p14:dur="2000"/>
     </mc:Choice>
-    <mc:Fallback xmlns="">
+    <mc:Fallback>
       <p:transition spd="slow"/>
     </mc:Fallback>
   </mc:AlternateContent>
@@ -23287,11 +23287,11 @@
   <p:clrMapOvr>
     <a:masterClrMapping/>
   </p:clrMapOvr>
-  <mc:AlternateContent xmlns:mc="http://schemas.openxmlformats.org/markup-compatibility/2006" xmlns:p14="http://schemas.microsoft.com/office/powerpoint/2010/main">
-    <mc:Choice Requires="p14">
+  <mc:AlternateContent xmlns:mc="http://schemas.openxmlformats.org/markup-compatibility/2006">
+    <mc:Choice xmlns:p14="http://schemas.microsoft.com/office/powerpoint/2010/main" Requires="p14">
       <p:transition spd="slow" p14:dur="2000"/>
     </mc:Choice>
-    <mc:Fallback xmlns="">
+    <mc:Fallback>
       <p:transition spd="slow"/>
     </mc:Fallback>
   </mc:AlternateContent>
@@ -23508,11 +23508,11 @@
   <p:clrMapOvr>
     <a:masterClrMapping/>
   </p:clrMapOvr>
-  <mc:AlternateContent xmlns:mc="http://schemas.openxmlformats.org/markup-compatibility/2006" xmlns:p14="http://schemas.microsoft.com/office/powerpoint/2010/main">
-    <mc:Choice Requires="p14">
+  <mc:AlternateContent xmlns:mc="http://schemas.openxmlformats.org/markup-compatibility/2006">
+    <mc:Choice xmlns:p14="http://schemas.microsoft.com/office/powerpoint/2010/main" Requires="p14">
       <p:transition spd="slow" p14:dur="2000"/>
     </mc:Choice>
-    <mc:Fallback xmlns="">
+    <mc:Fallback>
       <p:transition spd="slow"/>
     </mc:Fallback>
   </mc:AlternateContent>
@@ -23647,11 +23647,11 @@
   <p:clrMapOvr>
     <a:masterClrMapping/>
   </p:clrMapOvr>
-  <mc:AlternateContent xmlns:mc="http://schemas.openxmlformats.org/markup-compatibility/2006" xmlns:p14="http://schemas.microsoft.com/office/powerpoint/2010/main">
-    <mc:Choice Requires="p14">
+  <mc:AlternateContent xmlns:mc="http://schemas.openxmlformats.org/markup-compatibility/2006">
+    <mc:Choice xmlns:p14="http://schemas.microsoft.com/office/powerpoint/2010/main" Requires="p14">
       <p:transition spd="slow" p14:dur="2000"/>
     </mc:Choice>
-    <mc:Fallback xmlns="">
+    <mc:Fallback>
       <p:transition spd="slow"/>
     </mc:Fallback>
   </mc:AlternateContent>
@@ -23805,11 +23805,11 @@
   <p:clrMapOvr>
     <a:masterClrMapping/>
   </p:clrMapOvr>
-  <mc:AlternateContent xmlns:mc="http://schemas.openxmlformats.org/markup-compatibility/2006" xmlns:p14="http://schemas.microsoft.com/office/powerpoint/2010/main">
-    <mc:Choice Requires="p14">
+  <mc:AlternateContent xmlns:mc="http://schemas.openxmlformats.org/markup-compatibility/2006">
+    <mc:Choice xmlns:p14="http://schemas.microsoft.com/office/powerpoint/2010/main" Requires="p14">
       <p:transition spd="slow" p14:dur="2000"/>
     </mc:Choice>
-    <mc:Fallback xmlns="">
+    <mc:Fallback>
       <p:transition spd="slow"/>
     </mc:Fallback>
   </mc:AlternateContent>
@@ -24183,11 +24183,11 @@
   <p:clrMapOvr>
     <a:masterClrMapping/>
   </p:clrMapOvr>
-  <mc:AlternateContent xmlns:mc="http://schemas.openxmlformats.org/markup-compatibility/2006" xmlns:p14="http://schemas.microsoft.com/office/powerpoint/2010/main">
-    <mc:Choice Requires="p14">
+  <mc:AlternateContent xmlns:mc="http://schemas.openxmlformats.org/markup-compatibility/2006">
+    <mc:Choice xmlns:p14="http://schemas.microsoft.com/office/powerpoint/2010/main" Requires="p14">
       <p:transition spd="slow" p14:dur="2000"/>
     </mc:Choice>
-    <mc:Fallback xmlns="">
+    <mc:Fallback>
       <p:transition spd="slow"/>
     </mc:Fallback>
   </mc:AlternateContent>
@@ -24618,11 +24618,11 @@
   <p:clrMapOvr>
     <a:masterClrMapping/>
   </p:clrMapOvr>
-  <mc:AlternateContent xmlns:mc="http://schemas.openxmlformats.org/markup-compatibility/2006" xmlns:p14="http://schemas.microsoft.com/office/powerpoint/2010/main">
-    <mc:Choice Requires="p14">
+  <mc:AlternateContent xmlns:mc="http://schemas.openxmlformats.org/markup-compatibility/2006">
+    <mc:Choice xmlns:p14="http://schemas.microsoft.com/office/powerpoint/2010/main" Requires="p14">
       <p:transition spd="slow" p14:dur="2000"/>
     </mc:Choice>
-    <mc:Fallback xmlns="">
+    <mc:Fallback>
       <p:transition spd="slow"/>
     </mc:Fallback>
   </mc:AlternateContent>
@@ -24834,11 +24834,11 @@
   <p:clrMapOvr>
     <a:masterClrMapping/>
   </p:clrMapOvr>
-  <mc:AlternateContent xmlns:mc="http://schemas.openxmlformats.org/markup-compatibility/2006" xmlns:p14="http://schemas.microsoft.com/office/powerpoint/2010/main">
-    <mc:Choice Requires="p14">
+  <mc:AlternateContent xmlns:mc="http://schemas.openxmlformats.org/markup-compatibility/2006">
+    <mc:Choice xmlns:p14="http://schemas.microsoft.com/office/powerpoint/2010/main" Requires="p14">
       <p:transition spd="slow" p14:dur="2000"/>
     </mc:Choice>
-    <mc:Fallback xmlns="">
+    <mc:Fallback>
       <p:transition spd="slow"/>
     </mc:Fallback>
   </mc:AlternateContent>
@@ -25086,11 +25086,11 @@
   <p:clrMapOvr>
     <a:masterClrMapping/>
   </p:clrMapOvr>
-  <mc:AlternateContent xmlns:mc="http://schemas.openxmlformats.org/markup-compatibility/2006" xmlns:p14="http://schemas.microsoft.com/office/powerpoint/2010/main">
-    <mc:Choice Requires="p14">
+  <mc:AlternateContent xmlns:mc="http://schemas.openxmlformats.org/markup-compatibility/2006">
+    <mc:Choice xmlns:p14="http://schemas.microsoft.com/office/powerpoint/2010/main" Requires="p14">
       <p:transition spd="slow" p14:dur="2000"/>
     </mc:Choice>
-    <mc:Fallback xmlns="">
+    <mc:Fallback>
       <p:transition spd="slow"/>
     </mc:Fallback>
   </mc:AlternateContent>
@@ -25270,11 +25270,11 @@
   <p:clrMapOvr>
     <a:masterClrMapping/>
   </p:clrMapOvr>
-  <mc:AlternateContent xmlns:mc="http://schemas.openxmlformats.org/markup-compatibility/2006" xmlns:p14="http://schemas.microsoft.com/office/powerpoint/2010/main">
-    <mc:Choice Requires="p14">
+  <mc:AlternateContent xmlns:mc="http://schemas.openxmlformats.org/markup-compatibility/2006">
+    <mc:Choice xmlns:p14="http://schemas.microsoft.com/office/powerpoint/2010/main" Requires="p14">
       <p:transition spd="slow" p14:dur="2000"/>
     </mc:Choice>
-    <mc:Fallback xmlns="">
+    <mc:Fallback>
       <p:transition spd="slow"/>
     </mc:Fallback>
   </mc:AlternateContent>
@@ -25489,11 +25489,11 @@
   <p:clrMapOvr>
     <a:masterClrMapping/>
   </p:clrMapOvr>
-  <mc:AlternateContent xmlns:mc="http://schemas.openxmlformats.org/markup-compatibility/2006" xmlns:p14="http://schemas.microsoft.com/office/powerpoint/2010/main">
-    <mc:Choice Requires="p14">
+  <mc:AlternateContent xmlns:mc="http://schemas.openxmlformats.org/markup-compatibility/2006">
+    <mc:Choice xmlns:p14="http://schemas.microsoft.com/office/powerpoint/2010/main" Requires="p14">
       <p:transition spd="slow" p14:dur="2000"/>
     </mc:Choice>
-    <mc:Fallback xmlns="">
+    <mc:Fallback>
       <p:transition spd="slow"/>
     </mc:Fallback>
   </mc:AlternateContent>
@@ -25685,11 +25685,11 @@
   <p:clrMapOvr>
     <a:masterClrMapping/>
   </p:clrMapOvr>
-  <mc:AlternateContent xmlns:mc="http://schemas.openxmlformats.org/markup-compatibility/2006" xmlns:p14="http://schemas.microsoft.com/office/powerpoint/2010/main">
-    <mc:Choice Requires="p14">
+  <mc:AlternateContent xmlns:mc="http://schemas.openxmlformats.org/markup-compatibility/2006">
+    <mc:Choice xmlns:p14="http://schemas.microsoft.com/office/powerpoint/2010/main" Requires="p14">
       <p:transition spd="slow" p14:dur="2000"/>
     </mc:Choice>
-    <mc:Fallback xmlns="">
+    <mc:Fallback>
       <p:transition spd="slow"/>
     </mc:Fallback>
   </mc:AlternateContent>
@@ -25891,11 +25891,11 @@
   <p:clrMapOvr>
     <a:masterClrMapping/>
   </p:clrMapOvr>
-  <mc:AlternateContent xmlns:mc="http://schemas.openxmlformats.org/markup-compatibility/2006" xmlns:p14="http://schemas.microsoft.com/office/powerpoint/2010/main">
-    <mc:Choice Requires="p14">
+  <mc:AlternateContent xmlns:mc="http://schemas.openxmlformats.org/markup-compatibility/2006">
+    <mc:Choice xmlns:p14="http://schemas.microsoft.com/office/powerpoint/2010/main" Requires="p14">
       <p:transition spd="slow" p14:dur="2000"/>
     </mc:Choice>
-    <mc:Fallback xmlns="">
+    <mc:Fallback>
       <p:transition spd="slow"/>
     </mc:Fallback>
   </mc:AlternateContent>
@@ -26089,11 +26089,11 @@
   <p:clrMapOvr>
     <a:masterClrMapping/>
   </p:clrMapOvr>
-  <mc:AlternateContent xmlns:mc="http://schemas.openxmlformats.org/markup-compatibility/2006" xmlns:p14="http://schemas.microsoft.com/office/powerpoint/2010/main">
-    <mc:Choice Requires="p14">
+  <mc:AlternateContent xmlns:mc="http://schemas.openxmlformats.org/markup-compatibility/2006">
+    <mc:Choice xmlns:p14="http://schemas.microsoft.com/office/powerpoint/2010/main" Requires="p14">
       <p:transition spd="slow" p14:dur="2000"/>
     </mc:Choice>
-    <mc:Fallback xmlns="">
+    <mc:Fallback>
       <p:transition spd="slow"/>
     </mc:Fallback>
   </mc:AlternateContent>
@@ -26491,11 +26491,11 @@
   <p:clrMapOvr>
     <a:masterClrMapping/>
   </p:clrMapOvr>
-  <mc:AlternateContent xmlns:mc="http://schemas.openxmlformats.org/markup-compatibility/2006" xmlns:p14="http://schemas.microsoft.com/office/powerpoint/2010/main">
-    <mc:Choice Requires="p14">
+  <mc:AlternateContent xmlns:mc="http://schemas.openxmlformats.org/markup-compatibility/2006">
+    <mc:Choice xmlns:p14="http://schemas.microsoft.com/office/powerpoint/2010/main" Requires="p14">
       <p:transition spd="slow" p14:dur="2000"/>
     </mc:Choice>
-    <mc:Fallback xmlns="">
+    <mc:Fallback>
       <p:transition spd="slow"/>
     </mc:Fallback>
   </mc:AlternateContent>
@@ -26881,11 +26881,11 @@
   <p:clrMapOvr>
     <a:masterClrMapping/>
   </p:clrMapOvr>
-  <mc:AlternateContent xmlns:mc="http://schemas.openxmlformats.org/markup-compatibility/2006" xmlns:p14="http://schemas.microsoft.com/office/powerpoint/2010/main">
-    <mc:Choice Requires="p14">
+  <mc:AlternateContent xmlns:mc="http://schemas.openxmlformats.org/markup-compatibility/2006">
+    <mc:Choice xmlns:p14="http://schemas.microsoft.com/office/powerpoint/2010/main" Requires="p14">
       <p:transition spd="slow" p14:dur="2000"/>
     </mc:Choice>
-    <mc:Fallback xmlns="">
+    <mc:Fallback>
       <p:transition spd="slow"/>
     </mc:Fallback>
   </mc:AlternateContent>
@@ -27945,11 +27945,11 @@
   <p:clrMapOvr>
     <a:masterClrMapping/>
   </p:clrMapOvr>
-  <mc:AlternateContent xmlns:mc="http://schemas.openxmlformats.org/markup-compatibility/2006" xmlns:p14="http://schemas.microsoft.com/office/powerpoint/2010/main">
-    <mc:Choice Requires="p14">
+  <mc:AlternateContent xmlns:mc="http://schemas.openxmlformats.org/markup-compatibility/2006">
+    <mc:Choice xmlns:p14="http://schemas.microsoft.com/office/powerpoint/2010/main" Requires="p14">
       <p:transition spd="slow" p14:dur="2000"/>
     </mc:Choice>
-    <mc:Fallback xmlns="">
+    <mc:Fallback>
       <p:transition spd="slow"/>
     </mc:Fallback>
   </mc:AlternateContent>
@@ -28139,11 +28139,11 @@
   <p:clrMapOvr>
     <a:masterClrMapping/>
   </p:clrMapOvr>
-  <mc:AlternateContent xmlns:mc="http://schemas.openxmlformats.org/markup-compatibility/2006" xmlns:p14="http://schemas.microsoft.com/office/powerpoint/2010/main">
-    <mc:Choice Requires="p14">
+  <mc:AlternateContent xmlns:mc="http://schemas.openxmlformats.org/markup-compatibility/2006">
+    <mc:Choice xmlns:p14="http://schemas.microsoft.com/office/powerpoint/2010/main" Requires="p14">
       <p:transition spd="slow" p14:dur="2000"/>
     </mc:Choice>
-    <mc:Fallback xmlns="">
+    <mc:Fallback>
       <p:transition spd="slow"/>
     </mc:Fallback>
   </mc:AlternateContent>
@@ -28753,11 +28753,11 @@
   <p:clrMapOvr>
     <a:masterClrMapping/>
   </p:clrMapOvr>
-  <mc:AlternateContent xmlns:mc="http://schemas.openxmlformats.org/markup-compatibility/2006" xmlns:p14="http://schemas.microsoft.com/office/powerpoint/2010/main">
-    <mc:Choice Requires="p14">
+  <mc:AlternateContent xmlns:mc="http://schemas.openxmlformats.org/markup-compatibility/2006">
+    <mc:Choice xmlns:p14="http://schemas.microsoft.com/office/powerpoint/2010/main" Requires="p14">
       <p:transition spd="slow" p14:dur="2000"/>
     </mc:Choice>
-    <mc:Fallback xmlns="">
+    <mc:Fallback>
       <p:transition spd="slow"/>
     </mc:Fallback>
   </mc:AlternateContent>
@@ -28921,11 +28921,11 @@
   <p:clrMapOvr>
     <a:masterClrMapping/>
   </p:clrMapOvr>
-  <mc:AlternateContent xmlns:mc="http://schemas.openxmlformats.org/markup-compatibility/2006" xmlns:p14="http://schemas.microsoft.com/office/powerpoint/2010/main">
-    <mc:Choice Requires="p14">
+  <mc:AlternateContent xmlns:mc="http://schemas.openxmlformats.org/markup-compatibility/2006">
+    <mc:Choice xmlns:p14="http://schemas.microsoft.com/office/powerpoint/2010/main" Requires="p14">
       <p:transition spd="slow" p14:dur="2000"/>
     </mc:Choice>
-    <mc:Fallback xmlns="">
+    <mc:Fallback>
       <p:transition spd="slow"/>
     </mc:Fallback>
   </mc:AlternateContent>
@@ -29019,11 +29019,11 @@
   <p:clrMapOvr>
     <a:masterClrMapping/>
   </p:clrMapOvr>
-  <mc:AlternateContent xmlns:mc="http://schemas.openxmlformats.org/markup-compatibility/2006" xmlns:p14="http://schemas.microsoft.com/office/powerpoint/2010/main">
-    <mc:Choice Requires="p14">
+  <mc:AlternateContent xmlns:mc="http://schemas.openxmlformats.org/markup-compatibility/2006">
+    <mc:Choice xmlns:p14="http://schemas.microsoft.com/office/powerpoint/2010/main" Requires="p14">
       <p:transition spd="slow" p14:dur="2000"/>
     </mc:Choice>
-    <mc:Fallback xmlns="">
+    <mc:Fallback>
       <p:transition spd="slow"/>
     </mc:Fallback>
   </mc:AlternateContent>
@@ -29315,11 +29315,11 @@
   <p:clrMapOvr>
     <a:masterClrMapping/>
   </p:clrMapOvr>
-  <mc:AlternateContent xmlns:mc="http://schemas.openxmlformats.org/markup-compatibility/2006" xmlns:p14="http://schemas.microsoft.com/office/powerpoint/2010/main">
-    <mc:Choice Requires="p14">
+  <mc:AlternateContent xmlns:mc="http://schemas.openxmlformats.org/markup-compatibility/2006">
+    <mc:Choice xmlns:p14="http://schemas.microsoft.com/office/powerpoint/2010/main" Requires="p14">
       <p:transition spd="slow" p14:dur="2000"/>
     </mc:Choice>
-    <mc:Fallback xmlns="">
+    <mc:Fallback>
       <p:transition spd="slow"/>
     </mc:Fallback>
   </mc:AlternateContent>
@@ -29469,11 +29469,11 @@
   <p:clrMapOvr>
     <a:masterClrMapping/>
   </p:clrMapOvr>
-  <mc:AlternateContent xmlns:mc="http://schemas.openxmlformats.org/markup-compatibility/2006" xmlns:p14="http://schemas.microsoft.com/office/powerpoint/2010/main">
-    <mc:Choice Requires="p14">
+  <mc:AlternateContent xmlns:mc="http://schemas.openxmlformats.org/markup-compatibility/2006">
+    <mc:Choice xmlns:p14="http://schemas.microsoft.com/office/powerpoint/2010/main" Requires="p14">
       <p:transition spd="slow" p14:dur="2000"/>
     </mc:Choice>
-    <mc:Fallback xmlns="">
+    <mc:Fallback>
       <p:transition spd="slow"/>
     </mc:Fallback>
   </mc:AlternateContent>
@@ -29695,11 +29695,11 @@
   <p:clrMapOvr>
     <a:masterClrMapping/>
   </p:clrMapOvr>
-  <mc:AlternateContent xmlns:mc="http://schemas.openxmlformats.org/markup-compatibility/2006" xmlns:p14="http://schemas.microsoft.com/office/powerpoint/2010/main">
-    <mc:Choice Requires="p14">
+  <mc:AlternateContent xmlns:mc="http://schemas.openxmlformats.org/markup-compatibility/2006">
+    <mc:Choice xmlns:p14="http://schemas.microsoft.com/office/powerpoint/2010/main" Requires="p14">
       <p:transition spd="slow" p14:dur="2000"/>
     </mc:Choice>
-    <mc:Fallback xmlns="">
+    <mc:Fallback>
       <p:transition spd="slow"/>
     </mc:Fallback>
   </mc:AlternateContent>
@@ -30587,11 +30587,11 @@
   <p:clrMapOvr>
     <a:masterClrMapping/>
   </p:clrMapOvr>
-  <mc:AlternateContent xmlns:mc="http://schemas.openxmlformats.org/markup-compatibility/2006" xmlns:p14="http://schemas.microsoft.com/office/powerpoint/2010/main">
-    <mc:Choice Requires="p14">
+  <mc:AlternateContent xmlns:mc="http://schemas.openxmlformats.org/markup-compatibility/2006">
+    <mc:Choice xmlns:p14="http://schemas.microsoft.com/office/powerpoint/2010/main" Requires="p14">
       <p:transition spd="slow" p14:dur="2000"/>
     </mc:Choice>
-    <mc:Fallback xmlns="">
+    <mc:Fallback>
       <p:transition spd="slow"/>
     </mc:Fallback>
   </mc:AlternateContent>
@@ -30811,11 +30811,11 @@
   <p:clrMapOvr>
     <a:masterClrMapping/>
   </p:clrMapOvr>
-  <mc:AlternateContent xmlns:mc="http://schemas.openxmlformats.org/markup-compatibility/2006" xmlns:p14="http://schemas.microsoft.com/office/powerpoint/2010/main">
-    <mc:Choice Requires="p14">
+  <mc:AlternateContent xmlns:mc="http://schemas.openxmlformats.org/markup-compatibility/2006">
+    <mc:Choice xmlns:p14="http://schemas.microsoft.com/office/powerpoint/2010/main" Requires="p14">
       <p:transition spd="slow" p14:dur="2000"/>
     </mc:Choice>
-    <mc:Fallback xmlns="">
+    <mc:Fallback>
       <p:transition spd="slow"/>
     </mc:Fallback>
   </mc:AlternateContent>
@@ -31001,11 +31001,11 @@
   <p:clrMapOvr>
     <a:masterClrMapping/>
   </p:clrMapOvr>
-  <mc:AlternateContent xmlns:mc="http://schemas.openxmlformats.org/markup-compatibility/2006" xmlns:p14="http://schemas.microsoft.com/office/powerpoint/2010/main">
-    <mc:Choice Requires="p14">
+  <mc:AlternateContent xmlns:mc="http://schemas.openxmlformats.org/markup-compatibility/2006">
+    <mc:Choice xmlns:p14="http://schemas.microsoft.com/office/powerpoint/2010/main" Requires="p14">
       <p:transition spd="slow" p14:dur="2000"/>
     </mc:Choice>
-    <mc:Fallback xmlns="">
+    <mc:Fallback>
       <p:transition spd="slow"/>
     </mc:Fallback>
   </mc:AlternateContent>
@@ -32372,11 +32372,11 @@
   <p:clrMapOvr>
     <a:masterClrMapping/>
   </p:clrMapOvr>
-  <mc:AlternateContent xmlns:mc="http://schemas.openxmlformats.org/markup-compatibility/2006" xmlns:p14="http://schemas.microsoft.com/office/powerpoint/2010/main">
-    <mc:Choice Requires="p14">
+  <mc:AlternateContent xmlns:mc="http://schemas.openxmlformats.org/markup-compatibility/2006">
+    <mc:Choice xmlns:p14="http://schemas.microsoft.com/office/powerpoint/2010/main" Requires="p14">
       <p:transition spd="slow" p14:dur="2000"/>
     </mc:Choice>
-    <mc:Fallback xmlns="">
+    <mc:Fallback>
       <p:transition spd="slow"/>
     </mc:Fallback>
   </mc:AlternateContent>
@@ -32624,11 +32624,11 @@
   <p:clrMapOvr>
     <a:masterClrMapping/>
   </p:clrMapOvr>
-  <mc:AlternateContent xmlns:mc="http://schemas.openxmlformats.org/markup-compatibility/2006" xmlns:p14="http://schemas.microsoft.com/office/powerpoint/2010/main">
-    <mc:Choice Requires="p14">
+  <mc:AlternateContent xmlns:mc="http://schemas.openxmlformats.org/markup-compatibility/2006">
+    <mc:Choice xmlns:p14="http://schemas.microsoft.com/office/powerpoint/2010/main" Requires="p14">
       <p:transition spd="slow" p14:dur="2000"/>
     </mc:Choice>
-    <mc:Fallback xmlns="">
+    <mc:Fallback>
       <p:transition spd="slow"/>
     </mc:Fallback>
   </mc:AlternateContent>
@@ -32765,11 +32765,11 @@
   <p:clrMapOvr>
     <a:masterClrMapping/>
   </p:clrMapOvr>
-  <mc:AlternateContent xmlns:mc="http://schemas.openxmlformats.org/markup-compatibility/2006" xmlns:p14="http://schemas.microsoft.com/office/powerpoint/2010/main">
-    <mc:Choice Requires="p14">
+  <mc:AlternateContent xmlns:mc="http://schemas.openxmlformats.org/markup-compatibility/2006">
+    <mc:Choice xmlns:p14="http://schemas.microsoft.com/office/powerpoint/2010/main" Requires="p14">
       <p:transition spd="slow" p14:dur="2000"/>
     </mc:Choice>
-    <mc:Fallback xmlns="">
+    <mc:Fallback>
       <p:transition spd="slow"/>
     </mc:Fallback>
   </mc:AlternateContent>
@@ -33006,11 +33006,11 @@
   <p:clrMapOvr>
     <a:masterClrMapping/>
   </p:clrMapOvr>
-  <mc:AlternateContent xmlns:mc="http://schemas.openxmlformats.org/markup-compatibility/2006" xmlns:p14="http://schemas.microsoft.com/office/powerpoint/2010/main">
-    <mc:Choice Requires="p14">
+  <mc:AlternateContent xmlns:mc="http://schemas.openxmlformats.org/markup-compatibility/2006">
+    <mc:Choice xmlns:p14="http://schemas.microsoft.com/office/powerpoint/2010/main" Requires="p14">
       <p:transition spd="slow" p14:dur="2000"/>
     </mc:Choice>
-    <mc:Fallback xmlns="">
+    <mc:Fallback>
       <p:transition spd="slow"/>
     </mc:Fallback>
   </mc:AlternateContent>
@@ -36019,11 +36019,11 @@
   <p:clrMapOvr>
     <a:masterClrMapping/>
   </p:clrMapOvr>
-  <mc:AlternateContent xmlns:mc="http://schemas.openxmlformats.org/markup-compatibility/2006" xmlns:p14="http://schemas.microsoft.com/office/powerpoint/2010/main">
-    <mc:Choice Requires="p14">
+  <mc:AlternateContent xmlns:mc="http://schemas.openxmlformats.org/markup-compatibility/2006">
+    <mc:Choice xmlns:p14="http://schemas.microsoft.com/office/powerpoint/2010/main" Requires="p14">
       <p:transition spd="slow" p14:dur="2000"/>
     </mc:Choice>
-    <mc:Fallback xmlns="">
+    <mc:Fallback>
       <p:transition spd="slow"/>
     </mc:Fallback>
   </mc:AlternateContent>
@@ -37847,11 +37847,11 @@
   <p:clrMapOvr>
     <a:masterClrMapping/>
   </p:clrMapOvr>
-  <mc:AlternateContent xmlns:mc="http://schemas.openxmlformats.org/markup-compatibility/2006" xmlns:p14="http://schemas.microsoft.com/office/powerpoint/2010/main">
-    <mc:Choice Requires="p14">
+  <mc:AlternateContent xmlns:mc="http://schemas.openxmlformats.org/markup-compatibility/2006">
+    <mc:Choice xmlns:p14="http://schemas.microsoft.com/office/powerpoint/2010/main" Requires="p14">
       <p:transition spd="slow" p14:dur="2000"/>
     </mc:Choice>
-    <mc:Fallback xmlns="">
+    <mc:Fallback>
       <p:transition spd="slow"/>
     </mc:Fallback>
   </mc:AlternateContent>
@@ -38967,11 +38967,11 @@
   <p:clrMapOvr>
     <a:masterClrMapping/>
   </p:clrMapOvr>
-  <mc:AlternateContent xmlns:mc="http://schemas.openxmlformats.org/markup-compatibility/2006" xmlns:p14="http://schemas.microsoft.com/office/powerpoint/2010/main">
-    <mc:Choice Requires="p14">
+  <mc:AlternateContent xmlns:mc="http://schemas.openxmlformats.org/markup-compatibility/2006">
+    <mc:Choice xmlns:p14="http://schemas.microsoft.com/office/powerpoint/2010/main" Requires="p14">
       <p:transition spd="slow" p14:dur="2000"/>
     </mc:Choice>
-    <mc:Fallback xmlns="">
+    <mc:Fallback>
       <p:transition spd="slow"/>
     </mc:Fallback>
   </mc:AlternateContent>
@@ -39152,11 +39152,11 @@
   <p:clrMapOvr>
     <a:masterClrMapping/>
   </p:clrMapOvr>
-  <mc:AlternateContent xmlns:mc="http://schemas.openxmlformats.org/markup-compatibility/2006" xmlns:p14="http://schemas.microsoft.com/office/powerpoint/2010/main">
-    <mc:Choice Requires="p14">
+  <mc:AlternateContent xmlns:mc="http://schemas.openxmlformats.org/markup-compatibility/2006">
+    <mc:Choice xmlns:p14="http://schemas.microsoft.com/office/powerpoint/2010/main" Requires="p14">
       <p:transition spd="slow" p14:dur="2000"/>
     </mc:Choice>
-    <mc:Fallback xmlns="">
+    <mc:Fallback>
       <p:transition spd="slow"/>
     </mc:Fallback>
   </mc:AlternateContent>
@@ -39449,11 +39449,11 @@
   <p:clrMapOvr>
     <a:masterClrMapping/>
   </p:clrMapOvr>
-  <mc:AlternateContent xmlns:mc="http://schemas.openxmlformats.org/markup-compatibility/2006" xmlns:p14="http://schemas.microsoft.com/office/powerpoint/2010/main">
-    <mc:Choice Requires="p14">
+  <mc:AlternateContent xmlns:mc="http://schemas.openxmlformats.org/markup-compatibility/2006">
+    <mc:Choice xmlns:p14="http://schemas.microsoft.com/office/powerpoint/2010/main" Requires="p14">
       <p:transition spd="slow" p14:dur="2000"/>
     </mc:Choice>
-    <mc:Fallback xmlns="">
+    <mc:Fallback>
       <p:transition spd="slow"/>
     </mc:Fallback>
   </mc:AlternateContent>

</xml_diff>